<commit_message>
My homework #3 How does the web works?
</commit_message>
<xml_diff>
--- a/Presentation.pptx
+++ b/Presentation.pptx
@@ -18,7 +18,7 @@
 </file>
 
 <file path=ppt/slideLayouts/slideLayout1.xml><?xml version="1.0" encoding="utf-8"?>
-<p:sldLayout xmlns:a="http://schemas.openxmlformats.org/drawingml/2006/main" xmlns:p="http://schemas.openxmlformats.org/presentationml/2006/main" xmlns:r="http://schemas.openxmlformats.org/officeDocument/2006/relationships" xmlns:p14="http://schemas.microsoft.com/office/powerpoint/2010/main" xmlns:p15="http://schemas.microsoft.com/office/powerpoint/2012/main" xmlns:mc="http://schemas.openxmlformats.org/markup-compatibility/2006" type="tx" preserve="1">
+<p:sldLayout xmlns:a="http://schemas.openxmlformats.org/drawingml/2006/main" xmlns:p="http://schemas.openxmlformats.org/presentationml/2006/main" xmlns:r="http://schemas.openxmlformats.org/officeDocument/2006/relationships" xmlns:p14="http://schemas.microsoft.com/office/powerpoint/2010/main" xmlns:p15="http://schemas.microsoft.com/office/powerpoint/2012/main" xmlns:mc="http://schemas.openxmlformats.org/markup-compatibility/2006" type="title" preserve="1">
   <p:cSld name="Standard">
     <p:spTree>
       <p:nvGrpSpPr>
@@ -81,7 +81,7 @@
             <a:spLocks noGrp="1"/>
           </p:cNvSpPr>
           <p:nvPr>
-            <p:ph/>
+            <p:ph type="subTitle"/>
           </p:nvPr>
         </p:nvSpPr>
         <p:spPr>
@@ -98,14 +98,11 @@
           </a:ln>
         </p:spPr>
         <p:txBody>
-          <a:bodyPr lIns="0" rIns="0" tIns="0" bIns="0" anchor="t">
-            <a:normAutofit/>
+          <a:bodyPr lIns="0" rIns="0" tIns="0" bIns="0" anchor="ctr">
+            <a:noAutofit/>
           </a:bodyPr>
           <a:p>
-            <a:pPr indent="0">
-              <a:spcBef>
-                <a:spcPts val="1417"/>
-              </a:spcBef>
+            <a:pPr indent="0" algn="ctr">
               <a:buNone/>
             </a:pPr>
             <a:endParaRPr b="0" lang="fr-FR" sz="3200" spc="-1" strike="noStrike">
@@ -151,7 +148,7 @@
         <p:txBody>
           <a:bodyPr/>
           <a:p>
-            <a:fld id="{E7758476-46B4-4EC2-BB6A-7E47705645C8}" type="slidenum">
+            <a:fld id="{DDF9CEBA-DC22-4692-A9C4-51F1D3B122F9}" type="slidenum">
               <a:t>&lt;#&gt;</a:t>
             </a:fld>
           </a:p>
@@ -184,7 +181,7 @@
 </file>
 
 <file path=ppt/slideLayouts/slideLayout2.xml><?xml version="1.0" encoding="utf-8"?>
-<p:sldLayout xmlns:a="http://schemas.openxmlformats.org/drawingml/2006/main" xmlns:p="http://schemas.openxmlformats.org/presentationml/2006/main" xmlns:r="http://schemas.openxmlformats.org/officeDocument/2006/relationships" xmlns:p14="http://schemas.microsoft.com/office/powerpoint/2010/main" xmlns:p15="http://schemas.microsoft.com/office/powerpoint/2012/main" xmlns:mc="http://schemas.openxmlformats.org/markup-compatibility/2006" type="title" preserve="1">
+<p:sldLayout xmlns:a="http://schemas.openxmlformats.org/drawingml/2006/main" xmlns:p="http://schemas.openxmlformats.org/presentationml/2006/main" xmlns:r="http://schemas.openxmlformats.org/officeDocument/2006/relationships" xmlns:p14="http://schemas.microsoft.com/office/powerpoint/2010/main" xmlns:p15="http://schemas.microsoft.com/office/powerpoint/2012/main" xmlns:mc="http://schemas.openxmlformats.org/markup-compatibility/2006" type="tx" preserve="1">
   <p:cSld name="Standard">
     <p:spTree>
       <p:nvGrpSpPr>
@@ -247,7 +244,7 @@
             <a:spLocks noGrp="1"/>
           </p:cNvSpPr>
           <p:nvPr>
-            <p:ph type="subTitle"/>
+            <p:ph/>
           </p:nvPr>
         </p:nvSpPr>
         <p:spPr>
@@ -264,11 +261,14 @@
           </a:ln>
         </p:spPr>
         <p:txBody>
-          <a:bodyPr lIns="0" rIns="0" tIns="0" bIns="0" anchor="ctr">
-            <a:noAutofit/>
+          <a:bodyPr lIns="0" rIns="0" tIns="0" bIns="0" anchor="t">
+            <a:normAutofit/>
           </a:bodyPr>
           <a:p>
-            <a:pPr indent="0" algn="ctr">
+            <a:pPr indent="0">
+              <a:spcBef>
+                <a:spcPts val="1417"/>
+              </a:spcBef>
               <a:buNone/>
             </a:pPr>
             <a:endParaRPr b="0" lang="fr-FR" sz="3200" spc="-1" strike="noStrike">
@@ -314,7 +314,7 @@
         <p:txBody>
           <a:bodyPr/>
           <a:p>
-            <a:fld id="{FA10996C-E5D9-4521-A85D-02B8866CEAE6}" type="slidenum">
+            <a:fld id="{795A87CC-E61B-4BA1-BA1D-C95E68C30D64}" type="slidenum">
               <a:t>&lt;#&gt;</a:t>
             </a:fld>
           </a:p>
@@ -397,7 +397,7 @@
         <p:txBody>
           <a:bodyPr/>
           <a:p>
-            <a:fld id="{AFE66D7B-7BC1-4245-83FF-E7CE26294BB9}" type="slidenum">
+            <a:fld id="{DC104D5E-FD4A-4B03-AD08-809AE128C827}" type="slidenum">
               <a:t>&lt;#&gt;</a:t>
             </a:fld>
           </a:p>
@@ -556,7 +556,7 @@
                 </a:solidFill>
                 <a:latin typeface="Times New Roman"/>
               </a:rPr>
-              <a:t> </a:t>
+              <a:t>&lt;pied de page&gt;</a:t>
             </a:r>
             <a:endParaRPr b="0" lang="fr-FR" sz="1400" spc="-1" strike="noStrike">
               <a:solidFill>
@@ -621,14 +621,14 @@
                 <a:tab algn="l" pos="0"/>
               </a:tabLst>
             </a:pPr>
-            <a:fld id="{5BF18960-9DA8-4361-B979-BE980EB297EB}" type="slidenum">
+            <a:fld id="{40D06FCF-0637-4244-A788-2694CCA134E2}" type="slidenum">
               <a:rPr b="0" lang="fr-FR" sz="1400" spc="-1" strike="noStrike">
                 <a:solidFill>
                   <a:srgbClr val="000000"/>
                 </a:solidFill>
                 <a:latin typeface="Times New Roman"/>
               </a:rPr>
-              <a:t>4</a:t>
+              <a:t>&lt;numéro&gt;</a:t>
             </a:fld>
             <a:endParaRPr b="0" lang="fr-FR" sz="1400" spc="-1" strike="noStrike">
               <a:solidFill>
@@ -688,7 +688,7 @@
                 </a:solidFill>
                 <a:latin typeface="Times New Roman"/>
               </a:rPr>
-              <a:t> </a:t>
+              <a:t>&lt;date/heure&gt;</a:t>
             </a:r>
             <a:endParaRPr b="0" lang="fr-FR" sz="1400" spc="-1" strike="noStrike">
               <a:solidFill>
@@ -1086,7 +1086,7 @@
                 <a:tab algn="l" pos="0"/>
               </a:tabLst>
             </a:pPr>
-            <a:fld id="{9BEF3CB1-5C16-4062-AA1F-C7405CA5B259}" type="slidenum">
+            <a:fld id="{DCF4DCE9-3659-4FD7-8AF7-94666B1E269A}" type="slidenum">
               <a:rPr b="0" lang="en-US" sz="1200" spc="-1" strike="noStrike">
                 <a:solidFill>
                   <a:schemeClr val="dk1">
@@ -1204,25 +1204,7 @@
                 </a:solidFill>
                 <a:latin typeface="Arial"/>
               </a:rPr>
-              <a:t>Cliquez pour </a:t>
-            </a:r>
-            <a:r>
-              <a:rPr b="0" lang="fr-FR" sz="4400" spc="-1" strike="noStrike">
-                <a:solidFill>
-                  <a:srgbClr val="000000"/>
-                </a:solidFill>
-                <a:latin typeface="Arial"/>
-              </a:rPr>
-              <a:t>éditer le format </a:t>
-            </a:r>
-            <a:r>
-              <a:rPr b="0" lang="fr-FR" sz="4400" spc="-1" strike="noStrike">
-                <a:solidFill>
-                  <a:srgbClr val="000000"/>
-                </a:solidFill>
-                <a:latin typeface="Arial"/>
-              </a:rPr>
-              <a:t>du texte-titre</a:t>
+              <a:t>Cliquez pour éditer le format du texte-titre</a:t>
             </a:r>
             <a:endParaRPr b="0" lang="fr-FR" sz="4400" spc="-1" strike="noStrike">
               <a:solidFill>
@@ -1484,9 +1466,230 @@
           <a:chExt cx="0" cy="0"/>
         </a:xfrm>
       </p:grpSpPr>
+      <p:grpSp>
+        <p:nvGrpSpPr>
+          <p:cNvPr id="14" name="Group 1"/>
+          <p:cNvGrpSpPr/>
+          <p:nvPr/>
+        </p:nvGrpSpPr>
+        <p:grpSpPr>
+          <a:xfrm>
+            <a:off x="226080" y="432720"/>
+            <a:ext cx="1721520" cy="2924280"/>
+            <a:chOff x="226080" y="432720"/>
+            <a:chExt cx="1721520" cy="2924280"/>
+          </a:xfrm>
+        </p:grpSpPr>
+        <p:sp>
+          <p:nvSpPr>
+            <p:cNvPr id="15" name="Freeform 1"/>
+            <p:cNvSpPr/>
+            <p:nvPr/>
+          </p:nvSpPr>
+          <p:spPr>
+            <a:xfrm>
+              <a:off x="226080" y="466920"/>
+              <a:ext cx="1721520" cy="2890080"/>
+            </a:xfrm>
+            <a:custGeom>
+              <a:avLst/>
+              <a:gdLst>
+                <a:gd name="textAreaLeft" fmla="*/ 0 w 1721520"/>
+                <a:gd name="textAreaRight" fmla="*/ 1722240 w 1721520"/>
+                <a:gd name="textAreaTop" fmla="*/ 0 h 2890080"/>
+                <a:gd name="textAreaBottom" fmla="*/ 2890800 h 2890080"/>
+              </a:gdLst>
+              <a:ahLst/>
+              <a:rect l="textAreaLeft" t="textAreaTop" r="textAreaRight" b="textAreaBottom"/>
+              <a:pathLst>
+                <a:path w="965430" h="1620566">
+                  <a:moveTo>
+                    <a:pt x="0" y="0"/>
+                  </a:moveTo>
+                  <a:lnTo>
+                    <a:pt x="965430" y="0"/>
+                  </a:lnTo>
+                  <a:lnTo>
+                    <a:pt x="965430" y="1620566"/>
+                  </a:lnTo>
+                  <a:lnTo>
+                    <a:pt x="0" y="1620566"/>
+                  </a:lnTo>
+                  <a:close/>
+                </a:path>
+              </a:pathLst>
+            </a:custGeom>
+            <a:solidFill>
+              <a:srgbClr val="dddddd"/>
+            </a:solidFill>
+            <a:ln w="0">
+              <a:noFill/>
+            </a:ln>
+          </p:spPr>
+          <p:style>
+            <a:lnRef idx="0"/>
+            <a:fillRef idx="0"/>
+            <a:effectRef idx="0"/>
+            <a:fontRef idx="minor"/>
+          </p:style>
+          <p:txBody>
+            <a:bodyPr lIns="90000" rIns="90000" tIns="45000" bIns="45000" anchor="t">
+              <a:noAutofit/>
+            </a:bodyPr>
+            <a:p>
+              <a:endParaRPr b="0" lang="fr-FR" sz="1800" spc="-1" strike="noStrike">
+                <a:solidFill>
+                  <a:srgbClr val="000000"/>
+                </a:solidFill>
+                <a:latin typeface="Arial"/>
+              </a:endParaRPr>
+            </a:p>
+          </p:txBody>
+        </p:sp>
+        <p:sp>
+          <p:nvSpPr>
+            <p:cNvPr id="16" name="TextBox 1"/>
+            <p:cNvSpPr/>
+            <p:nvPr/>
+          </p:nvSpPr>
+          <p:spPr>
+            <a:xfrm>
+              <a:off x="226080" y="432720"/>
+              <a:ext cx="1721520" cy="2924280"/>
+            </a:xfrm>
+            <a:prstGeom prst="rect">
+              <a:avLst/>
+            </a:prstGeom>
+            <a:noFill/>
+            <a:ln w="0">
+              <a:noFill/>
+            </a:ln>
+          </p:spPr>
+          <p:style>
+            <a:lnRef idx="0"/>
+            <a:fillRef idx="0"/>
+            <a:effectRef idx="0"/>
+            <a:fontRef idx="minor"/>
+          </p:style>
+          <p:txBody>
+            <a:bodyPr lIns="25560" rIns="25560" tIns="25560" bIns="25560" anchor="ctr">
+              <a:noAutofit/>
+            </a:bodyPr>
+            <a:p>
+              <a:endParaRPr b="0" lang="en-US" sz="1800" spc="-1" strike="noStrike">
+                <a:solidFill>
+                  <a:schemeClr val="dk1"/>
+                </a:solidFill>
+                <a:latin typeface="Calibri"/>
+              </a:endParaRPr>
+            </a:p>
+          </p:txBody>
+        </p:sp>
+      </p:grpSp>
       <p:sp>
         <p:nvSpPr>
-          <p:cNvPr id="14" name="Freeform 15"/>
+          <p:cNvPr id="17" name="TextBox 2"/>
+          <p:cNvSpPr/>
+          <p:nvPr/>
+        </p:nvSpPr>
+        <p:spPr>
+          <a:xfrm rot="16200000">
+            <a:off x="7381800" y="2886840"/>
+            <a:ext cx="2719800" cy="1137960"/>
+          </a:xfrm>
+          <a:prstGeom prst="rect">
+            <a:avLst/>
+          </a:prstGeom>
+          <a:noFill/>
+          <a:ln w="0">
+            <a:noFill/>
+          </a:ln>
+        </p:spPr>
+        <p:style>
+          <a:lnRef idx="0"/>
+          <a:fillRef idx="0"/>
+          <a:effectRef idx="0"/>
+          <a:fontRef idx="minor"/>
+        </p:style>
+        <p:txBody>
+          <a:bodyPr lIns="0" rIns="0" tIns="0" bIns="0" anchor="t">
+            <a:spAutoFit/>
+          </a:bodyPr>
+          <a:p>
+            <a:pPr defTabSz="914400">
+              <a:lnSpc>
+                <a:spcPts val="4479"/>
+              </a:lnSpc>
+              <a:spcBef>
+                <a:spcPts val="1191"/>
+              </a:spcBef>
+              <a:spcAft>
+                <a:spcPts val="992"/>
+              </a:spcAft>
+            </a:pPr>
+            <a:r>
+              <a:rPr b="1" lang="en-US" sz="3200" spc="-1" strike="noStrike">
+                <a:solidFill>
+                  <a:srgbClr val="000000"/>
+                </a:solidFill>
+                <a:latin typeface="Playfair Display Bold"/>
+                <a:ea typeface="Playfair Display Bold"/>
+              </a:rPr>
+              <a:t>A little bit about myself</a:t>
+            </a:r>
+            <a:endParaRPr b="0" lang="fr-FR" sz="3200" spc="-1" strike="noStrike">
+              <a:solidFill>
+                <a:srgbClr val="000000"/>
+              </a:solidFill>
+              <a:latin typeface="Arial"/>
+            </a:endParaRPr>
+          </a:p>
+        </p:txBody>
+      </p:sp>
+      <p:sp>
+        <p:nvSpPr>
+          <p:cNvPr id="18" name="AutoShape 1"/>
+          <p:cNvSpPr/>
+          <p:nvPr/>
+        </p:nvSpPr>
+        <p:spPr>
+          <a:xfrm>
+            <a:off x="8503920" y="-291240"/>
+            <a:ext cx="360" cy="3020040"/>
+          </a:xfrm>
+          <a:prstGeom prst="line">
+            <a:avLst/>
+          </a:prstGeom>
+          <a:ln w="19050">
+            <a:solidFill>
+              <a:srgbClr val="5b5b5b"/>
+            </a:solidFill>
+            <a:round/>
+          </a:ln>
+        </p:spPr>
+        <p:style>
+          <a:lnRef idx="0"/>
+          <a:fillRef idx="0"/>
+          <a:effectRef idx="0"/>
+          <a:fontRef idx="minor"/>
+        </p:style>
+        <p:txBody>
+          <a:bodyPr lIns="90000" rIns="90000" tIns="45000" bIns="45000" anchor="t" anchorCtr="1">
+            <a:noAutofit/>
+          </a:bodyPr>
+          <a:p>
+            <a:endParaRPr b="0" lang="fr-FR" sz="1800" spc="-1" strike="noStrike">
+              <a:solidFill>
+                <a:srgbClr val="000000"/>
+              </a:solidFill>
+              <a:latin typeface="Arial"/>
+            </a:endParaRPr>
+          </a:p>
+        </p:txBody>
+      </p:sp>
+      <p:sp>
+        <p:nvSpPr>
+          <p:cNvPr id="19" name="Freeform 2"/>
           <p:cNvSpPr/>
           <p:nvPr/>
         </p:nvSpPr>
@@ -1557,434 +1760,7 @@
       </p:sp>
       <p:sp>
         <p:nvSpPr>
-          <p:cNvPr id="15" name="TextBox 26"/>
-          <p:cNvSpPr/>
-          <p:nvPr/>
-        </p:nvSpPr>
-        <p:spPr>
-          <a:xfrm>
-            <a:off x="1761120" y="-51840"/>
-            <a:ext cx="8580960" cy="412560"/>
-          </a:xfrm>
-          <a:prstGeom prst="rect">
-            <a:avLst/>
-          </a:prstGeom>
-          <a:noFill/>
-          <a:ln w="0">
-            <a:noFill/>
-          </a:ln>
-        </p:spPr>
-        <p:style>
-          <a:lnRef idx="0"/>
-          <a:fillRef idx="0"/>
-          <a:effectRef idx="0"/>
-          <a:fontRef idx="minor"/>
-        </p:style>
-        <p:txBody>
-          <a:bodyPr lIns="0" rIns="0" tIns="0" bIns="0" anchor="t">
-            <a:spAutoFit/>
-          </a:bodyPr>
-          <a:p>
-            <a:pPr defTabSz="914400">
-              <a:lnSpc>
-                <a:spcPts val="3251"/>
-              </a:lnSpc>
-            </a:pPr>
-            <a:r>
-              <a:rPr b="1" lang="en-US" sz="1300" spc="-1" strike="noStrike">
-                <a:solidFill>
-                  <a:srgbClr val="000000"/>
-                </a:solidFill>
-                <a:latin typeface="Lora Bold"/>
-                <a:ea typeface="Lora Bold"/>
-              </a:rPr>
-              <a:t>Msc Software Engineering Program</a:t>
-            </a:r>
-            <a:endParaRPr b="0" lang="fr-FR" sz="1300" spc="-1" strike="noStrike">
-              <a:solidFill>
-                <a:srgbClr val="000000"/>
-              </a:solidFill>
-              <a:latin typeface="Arial"/>
-            </a:endParaRPr>
-          </a:p>
-        </p:txBody>
-      </p:sp>
-      <p:sp>
-        <p:nvSpPr>
-          <p:cNvPr id="16" name="TextBox 27"/>
-          <p:cNvSpPr/>
-          <p:nvPr/>
-        </p:nvSpPr>
-        <p:spPr>
-          <a:xfrm>
-            <a:off x="8955000" y="4872240"/>
-            <a:ext cx="72000" cy="177480"/>
-          </a:xfrm>
-          <a:prstGeom prst="rect">
-            <a:avLst/>
-          </a:prstGeom>
-          <a:noFill/>
-          <a:ln w="0">
-            <a:noFill/>
-          </a:ln>
-        </p:spPr>
-        <p:style>
-          <a:lnRef idx="0"/>
-          <a:fillRef idx="0"/>
-          <a:effectRef idx="0"/>
-          <a:fontRef idx="minor"/>
-        </p:style>
-        <p:txBody>
-          <a:bodyPr lIns="0" rIns="0" tIns="0" bIns="0" anchor="t">
-            <a:spAutoFit/>
-          </a:bodyPr>
-          <a:p>
-            <a:pPr algn="ctr" defTabSz="914400">
-              <a:lnSpc>
-                <a:spcPts val="1400"/>
-              </a:lnSpc>
-              <a:tabLst>
-                <a:tab algn="l" pos="0"/>
-              </a:tabLst>
-            </a:pPr>
-            <a:r>
-              <a:rPr b="0" lang="en-US" sz="1000" spc="-1" strike="noStrike">
-                <a:solidFill>
-                  <a:srgbClr val="000000"/>
-                </a:solidFill>
-                <a:latin typeface="Open Sans"/>
-                <a:ea typeface="Open Sans"/>
-              </a:rPr>
-              <a:t>1</a:t>
-            </a:r>
-            <a:endParaRPr b="0" lang="fr-FR" sz="1000" spc="-1" strike="noStrike">
-              <a:solidFill>
-                <a:srgbClr val="000000"/>
-              </a:solidFill>
-              <a:latin typeface="Arial"/>
-            </a:endParaRPr>
-          </a:p>
-        </p:txBody>
-      </p:sp>
-    </p:spTree>
-  </p:cSld>
-  <mc:AlternateContent>
-    <mc:Choice Requires="p14">
-      <p:transition spd="slow" p14:dur="2000"/>
-    </mc:Choice>
-    <mc:Fallback>
-      <p:transition spd="slow"/>
-    </mc:Fallback>
-  </mc:AlternateContent>
-</p:sld>
-</file>
-
-<file path=ppt/slides/slide2.xml><?xml version="1.0" encoding="utf-8"?>
-<p:sld xmlns:a="http://schemas.openxmlformats.org/drawingml/2006/main" xmlns:p="http://schemas.openxmlformats.org/presentationml/2006/main" xmlns:r="http://schemas.openxmlformats.org/officeDocument/2006/relationships" xmlns:p14="http://schemas.microsoft.com/office/powerpoint/2010/main" xmlns:p15="http://schemas.microsoft.com/office/powerpoint/2012/main" xmlns:mc="http://schemas.openxmlformats.org/markup-compatibility/2006">
-  <p:cSld>
-    <p:spTree>
-      <p:nvGrpSpPr>
-        <p:cNvPr id="1" name=""/>
-        <p:cNvGrpSpPr/>
-        <p:nvPr/>
-      </p:nvGrpSpPr>
-      <p:grpSpPr>
-        <a:xfrm>
-          <a:off x="0" y="0"/>
-          <a:ext cx="0" cy="0"/>
-          <a:chOff x="0" y="0"/>
-          <a:chExt cx="0" cy="0"/>
-        </a:xfrm>
-      </p:grpSpPr>
-      <p:grpSp>
-        <p:nvGrpSpPr>
-          <p:cNvPr id="17" name="Group 1"/>
-          <p:cNvGrpSpPr/>
-          <p:nvPr/>
-        </p:nvGrpSpPr>
-        <p:grpSpPr>
-          <a:xfrm>
-            <a:off x="226080" y="432720"/>
-            <a:ext cx="1721520" cy="2924280"/>
-            <a:chOff x="226080" y="432720"/>
-            <a:chExt cx="1721520" cy="2924280"/>
-          </a:xfrm>
-        </p:grpSpPr>
-        <p:sp>
-          <p:nvSpPr>
-            <p:cNvPr id="18" name="Freeform 1"/>
-            <p:cNvSpPr/>
-            <p:nvPr/>
-          </p:nvSpPr>
-          <p:spPr>
-            <a:xfrm>
-              <a:off x="226080" y="466920"/>
-              <a:ext cx="1721520" cy="2890080"/>
-            </a:xfrm>
-            <a:custGeom>
-              <a:avLst/>
-              <a:gdLst>
-                <a:gd name="textAreaLeft" fmla="*/ 0 w 1721520"/>
-                <a:gd name="textAreaRight" fmla="*/ 1722240 w 1721520"/>
-                <a:gd name="textAreaTop" fmla="*/ 0 h 2890080"/>
-                <a:gd name="textAreaBottom" fmla="*/ 2890800 h 2890080"/>
-              </a:gdLst>
-              <a:ahLst/>
-              <a:rect l="textAreaLeft" t="textAreaTop" r="textAreaRight" b="textAreaBottom"/>
-              <a:pathLst>
-                <a:path w="965430" h="1620566">
-                  <a:moveTo>
-                    <a:pt x="0" y="0"/>
-                  </a:moveTo>
-                  <a:lnTo>
-                    <a:pt x="965430" y="0"/>
-                  </a:lnTo>
-                  <a:lnTo>
-                    <a:pt x="965430" y="1620566"/>
-                  </a:lnTo>
-                  <a:lnTo>
-                    <a:pt x="0" y="1620566"/>
-                  </a:lnTo>
-                  <a:close/>
-                </a:path>
-              </a:pathLst>
-            </a:custGeom>
-            <a:solidFill>
-              <a:srgbClr val="dddddd"/>
-            </a:solidFill>
-            <a:ln w="0">
-              <a:noFill/>
-            </a:ln>
-          </p:spPr>
-          <p:style>
-            <a:lnRef idx="0"/>
-            <a:fillRef idx="0"/>
-            <a:effectRef idx="0"/>
-            <a:fontRef idx="minor"/>
-          </p:style>
-          <p:txBody>
-            <a:bodyPr lIns="90000" rIns="90000" tIns="45000" bIns="45000" anchor="t">
-              <a:noAutofit/>
-            </a:bodyPr>
-            <a:p>
-              <a:endParaRPr b="0" lang="fr-FR" sz="1800" spc="-1" strike="noStrike">
-                <a:solidFill>
-                  <a:srgbClr val="000000"/>
-                </a:solidFill>
-                <a:latin typeface="Arial"/>
-              </a:endParaRPr>
-            </a:p>
-          </p:txBody>
-        </p:sp>
-        <p:sp>
-          <p:nvSpPr>
-            <p:cNvPr id="19" name="TextBox 1"/>
-            <p:cNvSpPr/>
-            <p:nvPr/>
-          </p:nvSpPr>
-          <p:spPr>
-            <a:xfrm>
-              <a:off x="226080" y="432720"/>
-              <a:ext cx="1721520" cy="2924280"/>
-            </a:xfrm>
-            <a:prstGeom prst="rect">
-              <a:avLst/>
-            </a:prstGeom>
-            <a:noFill/>
-            <a:ln w="0">
-              <a:noFill/>
-            </a:ln>
-          </p:spPr>
-          <p:style>
-            <a:lnRef idx="0"/>
-            <a:fillRef idx="0"/>
-            <a:effectRef idx="0"/>
-            <a:fontRef idx="minor"/>
-          </p:style>
-          <p:txBody>
-            <a:bodyPr lIns="25560" rIns="25560" tIns="25560" bIns="25560" anchor="ctr">
-              <a:noAutofit/>
-            </a:bodyPr>
-            <a:p>
-              <a:endParaRPr b="0" lang="en-US" sz="1800" spc="-1" strike="noStrike">
-                <a:solidFill>
-                  <a:schemeClr val="dk1"/>
-                </a:solidFill>
-                <a:latin typeface="Calibri"/>
-              </a:endParaRPr>
-            </a:p>
-          </p:txBody>
-        </p:sp>
-      </p:grpSp>
-      <p:sp>
-        <p:nvSpPr>
-          <p:cNvPr id="20" name="TextBox 2"/>
-          <p:cNvSpPr/>
-          <p:nvPr/>
-        </p:nvSpPr>
-        <p:spPr>
-          <a:xfrm rot="16200000">
-            <a:off x="7381440" y="2887200"/>
-            <a:ext cx="2719800" cy="1137240"/>
-          </a:xfrm>
-          <a:prstGeom prst="rect">
-            <a:avLst/>
-          </a:prstGeom>
-          <a:noFill/>
-          <a:ln w="0">
-            <a:noFill/>
-          </a:ln>
-        </p:spPr>
-        <p:style>
-          <a:lnRef idx="0"/>
-          <a:fillRef idx="0"/>
-          <a:effectRef idx="0"/>
-          <a:fontRef idx="minor"/>
-        </p:style>
-        <p:txBody>
-          <a:bodyPr lIns="0" rIns="0" tIns="0" bIns="0" anchor="t">
-            <a:spAutoFit/>
-          </a:bodyPr>
-          <a:p>
-            <a:pPr defTabSz="914400">
-              <a:lnSpc>
-                <a:spcPts val="4479"/>
-              </a:lnSpc>
-            </a:pPr>
-            <a:r>
-              <a:rPr b="1" lang="en-US" sz="3200" spc="-1" strike="noStrike">
-                <a:solidFill>
-                  <a:srgbClr val="000000"/>
-                </a:solidFill>
-                <a:latin typeface="Playfair Display Bold"/>
-                <a:ea typeface="Playfair Display Bold"/>
-              </a:rPr>
-              <a:t>A little bit on me</a:t>
-            </a:r>
-            <a:endParaRPr b="0" lang="fr-FR" sz="3200" spc="-1" strike="noStrike">
-              <a:solidFill>
-                <a:srgbClr val="000000"/>
-              </a:solidFill>
-              <a:latin typeface="Arial"/>
-            </a:endParaRPr>
-          </a:p>
-        </p:txBody>
-      </p:sp>
-      <p:sp>
-        <p:nvSpPr>
-          <p:cNvPr id="21" name="AutoShape 1"/>
-          <p:cNvSpPr/>
-          <p:nvPr/>
-        </p:nvSpPr>
-        <p:spPr>
-          <a:xfrm>
-            <a:off x="8503920" y="-291240"/>
-            <a:ext cx="360" cy="3020040"/>
-          </a:xfrm>
-          <a:prstGeom prst="line">
-            <a:avLst/>
-          </a:prstGeom>
-          <a:ln w="19050">
-            <a:solidFill>
-              <a:srgbClr val="5b5b5b"/>
-            </a:solidFill>
-            <a:round/>
-          </a:ln>
-        </p:spPr>
-        <p:style>
-          <a:lnRef idx="0"/>
-          <a:fillRef idx="0"/>
-          <a:effectRef idx="0"/>
-          <a:fontRef idx="minor"/>
-        </p:style>
-        <p:txBody>
-          <a:bodyPr lIns="90000" rIns="90000" tIns="45000" bIns="45000" anchor="t" anchorCtr="1">
-            <a:noAutofit/>
-          </a:bodyPr>
-          <a:p>
-            <a:endParaRPr b="0" lang="fr-FR" sz="1800" spc="-1" strike="noStrike">
-              <a:solidFill>
-                <a:srgbClr val="000000"/>
-              </a:solidFill>
-              <a:latin typeface="Arial"/>
-            </a:endParaRPr>
-          </a:p>
-        </p:txBody>
-      </p:sp>
-      <p:sp>
-        <p:nvSpPr>
-          <p:cNvPr id="22" name="Freeform 2"/>
-          <p:cNvSpPr/>
-          <p:nvPr/>
-        </p:nvSpPr>
-        <p:spPr>
-          <a:xfrm>
-            <a:off x="226080" y="9000"/>
-            <a:ext cx="1333440" cy="344160"/>
-          </a:xfrm>
-          <a:custGeom>
-            <a:avLst/>
-            <a:gdLst>
-              <a:gd name="textAreaLeft" fmla="*/ 0 w 1333440"/>
-              <a:gd name="textAreaRight" fmla="*/ 1334160 w 1333440"/>
-              <a:gd name="textAreaTop" fmla="*/ 0 h 344160"/>
-              <a:gd name="textAreaBottom" fmla="*/ 344880 h 344160"/>
-            </a:gdLst>
-            <a:ahLst/>
-            <a:rect l="textAreaLeft" t="textAreaTop" r="textAreaRight" b="textAreaBottom"/>
-            <a:pathLst>
-              <a:path w="1334002" h="344766">
-                <a:moveTo>
-                  <a:pt x="0" y="0"/>
-                </a:moveTo>
-                <a:lnTo>
-                  <a:pt x="1334002" y="0"/>
-                </a:lnTo>
-                <a:lnTo>
-                  <a:pt x="1334002" y="344766"/>
-                </a:lnTo>
-                <a:lnTo>
-                  <a:pt x="0" y="344766"/>
-                </a:lnTo>
-                <a:lnTo>
-                  <a:pt x="0" y="0"/>
-                </a:lnTo>
-                <a:close/>
-              </a:path>
-            </a:pathLst>
-          </a:custGeom>
-          <a:blipFill rotWithShape="0">
-            <a:blip r:embed="rId1"/>
-            <a:srcRect/>
-            <a:stretch/>
-          </a:blipFill>
-          <a:ln w="0">
-            <a:noFill/>
-          </a:ln>
-        </p:spPr>
-        <p:style>
-          <a:lnRef idx="0"/>
-          <a:fillRef idx="0"/>
-          <a:effectRef idx="0"/>
-          <a:fontRef idx="minor"/>
-        </p:style>
-        <p:txBody>
-          <a:bodyPr lIns="90000" rIns="90000" tIns="45000" bIns="45000" anchor="t">
-            <a:noAutofit/>
-          </a:bodyPr>
-          <a:p>
-            <a:endParaRPr b="0" lang="fr-FR" sz="1800" spc="-1" strike="noStrike">
-              <a:solidFill>
-                <a:srgbClr val="000000"/>
-              </a:solidFill>
-              <a:latin typeface="Arial"/>
-            </a:endParaRPr>
-          </a:p>
-        </p:txBody>
-      </p:sp>
-      <p:sp>
-        <p:nvSpPr>
-          <p:cNvPr id="23" name="Freeform 4"/>
+          <p:cNvPr id="20" name="Freeform 4"/>
           <p:cNvSpPr/>
           <p:nvPr/>
         </p:nvSpPr>
@@ -2055,7 +1831,7 @@
       </p:sp>
       <p:grpSp>
         <p:nvGrpSpPr>
-          <p:cNvPr id="24" name="Group 3"/>
+          <p:cNvPr id="21" name="Group 3"/>
           <p:cNvGrpSpPr/>
           <p:nvPr/>
         </p:nvGrpSpPr>
@@ -2069,7 +1845,7 @@
         </p:grpSpPr>
         <p:sp>
           <p:nvSpPr>
-            <p:cNvPr id="25" name="TextBox 3"/>
+            <p:cNvPr id="22" name="TextBox 3"/>
             <p:cNvSpPr/>
             <p:nvPr/>
           </p:nvSpPr>
@@ -2123,7 +1899,7 @@
         </p:sp>
         <p:sp>
           <p:nvSpPr>
-            <p:cNvPr id="26" name="TextBox 5"/>
+            <p:cNvPr id="23" name="TextBox 5"/>
             <p:cNvSpPr/>
             <p:nvPr/>
           </p:nvSpPr>
@@ -2178,7 +1954,7 @@
       </p:grpSp>
       <p:sp>
         <p:nvSpPr>
-          <p:cNvPr id="27" name="TextBox 6"/>
+          <p:cNvPr id="24" name="TextBox 6"/>
           <p:cNvSpPr/>
           <p:nvPr/>
         </p:nvSpPr>
@@ -2232,7 +2008,7 @@
       </p:sp>
       <p:sp>
         <p:nvSpPr>
-          <p:cNvPr id="28" name="TextBox 7"/>
+          <p:cNvPr id="25" name="TextBox 7"/>
           <p:cNvSpPr/>
           <p:nvPr/>
         </p:nvSpPr>
@@ -2289,7 +2065,7 @@
       </p:sp>
       <p:sp>
         <p:nvSpPr>
-          <p:cNvPr id="29" name=""/>
+          <p:cNvPr id="26" name=""/>
           <p:cNvSpPr txBox="1"/>
           <p:nvPr/>
         </p:nvSpPr>
@@ -2313,31 +2089,40 @@
           <a:p>
             <a:pPr algn="just"/>
             <a:r>
+              <a:rPr b="0" lang="en-US" sz="2200" spc="-1" strike="noStrike">
+                <a:solidFill>
+                  <a:srgbClr val="000000"/>
+                </a:solidFill>
+                <a:latin typeface="Arial"/>
+              </a:rPr>
+              <a:t>Financial</a:t>
+            </a:r>
+            <a:r>
+              <a:rPr b="0" lang="fr-FR" sz="2200" spc="-1" strike="noStrike">
+                <a:solidFill>
+                  <a:srgbClr val="000000"/>
+                </a:solidFill>
+                <a:latin typeface="Arial"/>
+              </a:rPr>
+              <a:t> </a:t>
+            </a:r>
+            <a:r>
+              <a:rPr b="0" lang="en-US" sz="2200" spc="-1" strike="noStrike">
+                <a:solidFill>
+                  <a:srgbClr val="000000"/>
+                </a:solidFill>
+                <a:latin typeface="Arial"/>
+              </a:rPr>
+              <a:t>engineer since 2009, my present job is to work as a Consultant in Management. To I’m employee in a consulting firm established in Ivory Coast where may position is CEO. Actually, I lead this company since it formation on the sixth of jun  2015</a:t>
+            </a:r>
+            <a:r>
               <a:rPr b="0" lang="en-US" sz="1800" spc="-1" strike="noStrike">
                 <a:solidFill>
                   <a:srgbClr val="000000"/>
                 </a:solidFill>
                 <a:latin typeface="Arial"/>
               </a:rPr>
-              <a:t>Financial</a:t>
-            </a:r>
-            <a:r>
-              <a:rPr b="0" lang="fr-FR" sz="1800" spc="-1" strike="noStrike">
-                <a:solidFill>
-                  <a:srgbClr val="000000"/>
-                </a:solidFill>
-                <a:latin typeface="Arial"/>
-              </a:rPr>
-              <a:t> </a:t>
-            </a:r>
-            <a:r>
-              <a:rPr b="0" lang="en-US" sz="1800" spc="-1" strike="noStrike">
-                <a:solidFill>
-                  <a:srgbClr val="000000"/>
-                </a:solidFill>
-                <a:latin typeface="Arial"/>
-              </a:rPr>
-              <a:t>engineer since 2009, my present job is to work as a Consultant in Management. To I’m employee in a consulting firm established in Ivory Coast where may position is CEO. </a:t>
+              <a:t>. </a:t>
             </a:r>
             <a:r>
               <a:rPr b="0" lang="fr-FR" sz="1800" spc="-1" strike="noStrike">
@@ -2370,7 +2155,7 @@
 </p:sld>
 </file>
 
-<file path=ppt/slides/slide3.xml><?xml version="1.0" encoding="utf-8"?>
+<file path=ppt/slides/slide2.xml><?xml version="1.0" encoding="utf-8"?>
 <p:sld xmlns:a="http://schemas.openxmlformats.org/drawingml/2006/main" xmlns:p="http://schemas.openxmlformats.org/presentationml/2006/main" xmlns:r="http://schemas.openxmlformats.org/officeDocument/2006/relationships" xmlns:p14="http://schemas.microsoft.com/office/powerpoint/2010/main" xmlns:p15="http://schemas.microsoft.com/office/powerpoint/2012/main" xmlns:mc="http://schemas.openxmlformats.org/markup-compatibility/2006">
   <p:cSld>
     <p:spTree>
@@ -2389,7 +2174,7 @@
       </p:grpSpPr>
       <p:grpSp>
         <p:nvGrpSpPr>
-          <p:cNvPr id="30" name="Group 2"/>
+          <p:cNvPr id="27" name="Group 2"/>
           <p:cNvGrpSpPr/>
           <p:nvPr/>
         </p:nvGrpSpPr>
@@ -2403,7 +2188,7 @@
         </p:grpSpPr>
         <p:sp>
           <p:nvSpPr>
-            <p:cNvPr id="31" name="Freeform 3"/>
+            <p:cNvPr id="28" name="Freeform 3"/>
             <p:cNvSpPr/>
             <p:nvPr/>
           </p:nvSpPr>
@@ -2469,7 +2254,7 @@
         </p:sp>
         <p:sp>
           <p:nvSpPr>
-            <p:cNvPr id="32" name="TextBox 4"/>
+            <p:cNvPr id="29" name="TextBox 4"/>
             <p:cNvSpPr/>
             <p:nvPr/>
           </p:nvSpPr>
@@ -2509,7 +2294,7 @@
       </p:grpSp>
       <p:grpSp>
         <p:nvGrpSpPr>
-          <p:cNvPr id="33" name="Group 5"/>
+          <p:cNvPr id="30" name="Group 5"/>
           <p:cNvGrpSpPr/>
           <p:nvPr/>
         </p:nvGrpSpPr>
@@ -2523,7 +2308,7 @@
         </p:grpSpPr>
         <p:sp>
           <p:nvSpPr>
-            <p:cNvPr id="34" name="Freeform 6"/>
+            <p:cNvPr id="31" name="Freeform 6"/>
             <p:cNvSpPr/>
             <p:nvPr/>
           </p:nvSpPr>
@@ -2589,7 +2374,7 @@
         </p:sp>
         <p:sp>
           <p:nvSpPr>
-            <p:cNvPr id="35" name="TextBox 10"/>
+            <p:cNvPr id="32" name="TextBox 10"/>
             <p:cNvSpPr/>
             <p:nvPr/>
           </p:nvSpPr>
@@ -2629,7 +2414,7 @@
       </p:grpSp>
       <p:grpSp>
         <p:nvGrpSpPr>
-          <p:cNvPr id="36" name="Group 8"/>
+          <p:cNvPr id="33" name="Group 8"/>
           <p:cNvGrpSpPr/>
           <p:nvPr/>
         </p:nvGrpSpPr>
@@ -2643,7 +2428,7 @@
         </p:grpSpPr>
         <p:sp>
           <p:nvSpPr>
-            <p:cNvPr id="37" name="Freeform 9"/>
+            <p:cNvPr id="34" name="Freeform 9"/>
             <p:cNvSpPr/>
             <p:nvPr/>
           </p:nvSpPr>
@@ -2709,7 +2494,7 @@
         </p:sp>
         <p:sp>
           <p:nvSpPr>
-            <p:cNvPr id="38" name="TextBox 11"/>
+            <p:cNvPr id="35" name="TextBox 11"/>
             <p:cNvSpPr/>
             <p:nvPr/>
           </p:nvSpPr>
@@ -2749,7 +2534,7 @@
       </p:grpSp>
       <p:sp>
         <p:nvSpPr>
-          <p:cNvPr id="39" name="TextBox 12"/>
+          <p:cNvPr id="36" name="TextBox 12"/>
           <p:cNvSpPr/>
           <p:nvPr/>
         </p:nvSpPr>
@@ -2790,7 +2575,30 @@
                 <a:latin typeface="Lora"/>
                 <a:ea typeface="Lora"/>
               </a:rPr>
-              <a:t>This project the second assignment of February 2025 cohorte of Msc Software Engineering Program</a:t>
+              <a:t>This project the second assignment of February 2025  </a:t>
+            </a:r>
+            <a:endParaRPr b="0" lang="fr-FR" sz="900" spc="-1" strike="noStrike">
+              <a:solidFill>
+                <a:srgbClr val="000000"/>
+              </a:solidFill>
+              <a:latin typeface="Arial"/>
+            </a:endParaRPr>
+          </a:p>
+          <a:p>
+            <a:pPr defTabSz="914400">
+              <a:lnSpc>
+                <a:spcPts val="1522"/>
+              </a:lnSpc>
+            </a:pPr>
+            <a:r>
+              <a:rPr b="0" lang="en-US" sz="900" spc="12" strike="noStrike">
+                <a:solidFill>
+                  <a:srgbClr val="000000"/>
+                </a:solidFill>
+                <a:latin typeface="Lora"/>
+                <a:ea typeface="Lora"/>
+              </a:rPr>
+              <a:t>MSc Software Engineering Program</a:t>
             </a:r>
             <a:endParaRPr b="0" lang="fr-FR" sz="900" spc="-1" strike="noStrike">
               <a:solidFill>
@@ -2803,7 +2611,7 @@
       </p:sp>
       <p:sp>
         <p:nvSpPr>
-          <p:cNvPr id="40" name="TextBox 15"/>
+          <p:cNvPr id="37" name="TextBox 15"/>
           <p:cNvSpPr/>
           <p:nvPr/>
         </p:nvSpPr>
@@ -2857,13 +2665,13 @@
       </p:sp>
       <p:sp>
         <p:nvSpPr>
-          <p:cNvPr id="41" name="Freeform 13"/>
+          <p:cNvPr id="38" name="Freeform 14"/>
           <p:cNvSpPr/>
           <p:nvPr/>
         </p:nvSpPr>
         <p:spPr>
           <a:xfrm>
-            <a:off x="2388600" y="1519920"/>
+            <a:off x="6712560" y="1519920"/>
             <a:ext cx="1601280" cy="1286280"/>
           </a:xfrm>
           <a:custGeom>
@@ -2928,85 +2736,14 @@
       </p:sp>
       <p:sp>
         <p:nvSpPr>
-          <p:cNvPr id="42" name="Freeform 14"/>
+          <p:cNvPr id="39" name="TextBox 16"/>
           <p:cNvSpPr/>
           <p:nvPr/>
         </p:nvSpPr>
         <p:spPr>
           <a:xfrm>
-            <a:off x="6712560" y="1519920"/>
-            <a:ext cx="1601280" cy="1286280"/>
-          </a:xfrm>
-          <a:custGeom>
-            <a:avLst/>
-            <a:gdLst>
-              <a:gd name="textAreaLeft" fmla="*/ 0 w 1601280"/>
-              <a:gd name="textAreaRight" fmla="*/ 1602000 w 1601280"/>
-              <a:gd name="textAreaTop" fmla="*/ 0 h 1286280"/>
-              <a:gd name="textAreaBottom" fmla="*/ 1287000 h 1286280"/>
-            </a:gdLst>
-            <a:ahLst/>
-            <a:rect l="textAreaLeft" t="textAreaTop" r="textAreaRight" b="textAreaBottom"/>
-            <a:pathLst>
-              <a:path w="1601992" h="1287049">
-                <a:moveTo>
-                  <a:pt x="0" y="0"/>
-                </a:moveTo>
-                <a:lnTo>
-                  <a:pt x="1601992" y="0"/>
-                </a:lnTo>
-                <a:lnTo>
-                  <a:pt x="1601992" y="1287049"/>
-                </a:lnTo>
-                <a:lnTo>
-                  <a:pt x="0" y="1287049"/>
-                </a:lnTo>
-                <a:lnTo>
-                  <a:pt x="0" y="0"/>
-                </a:lnTo>
-                <a:close/>
-              </a:path>
-            </a:pathLst>
-          </a:custGeom>
-          <a:blipFill rotWithShape="0">
-            <a:blip r:embed="rId2"/>
-            <a:srcRect/>
-            <a:stretch/>
-          </a:blipFill>
-          <a:ln w="0">
-            <a:noFill/>
-          </a:ln>
-        </p:spPr>
-        <p:style>
-          <a:lnRef idx="0"/>
-          <a:fillRef idx="0"/>
-          <a:effectRef idx="0"/>
-          <a:fontRef idx="minor"/>
-        </p:style>
-        <p:txBody>
-          <a:bodyPr lIns="90000" rIns="90000" tIns="45000" bIns="45000" anchor="t">
-            <a:noAutofit/>
-          </a:bodyPr>
-          <a:p>
-            <a:endParaRPr b="0" lang="fr-FR" sz="1800" spc="-1" strike="noStrike">
-              <a:solidFill>
-                <a:srgbClr val="000000"/>
-              </a:solidFill>
-              <a:latin typeface="Arial"/>
-            </a:endParaRPr>
-          </a:p>
-        </p:txBody>
-      </p:sp>
-      <p:sp>
-        <p:nvSpPr>
-          <p:cNvPr id="43" name="TextBox 16"/>
-          <p:cNvSpPr/>
-          <p:nvPr/>
-        </p:nvSpPr>
-        <p:spPr>
-          <a:xfrm>
-            <a:off x="2376000" y="3248640"/>
-            <a:ext cx="1686960" cy="144000"/>
+            <a:off x="2284560" y="3248640"/>
+            <a:ext cx="1869840" cy="144000"/>
           </a:xfrm>
           <a:prstGeom prst="rect">
             <a:avLst/>
@@ -3023,7 +2760,7 @@
           <a:fontRef idx="minor"/>
         </p:style>
         <p:txBody>
-          <a:bodyPr lIns="0" rIns="0" tIns="0" bIns="0" anchor="t">
+          <a:bodyPr wrap="none" lIns="0" rIns="0" tIns="0" bIns="0" anchor="t">
             <a:spAutoFit/>
           </a:bodyPr>
           <a:p>
@@ -3033,27 +2770,27 @@
               </a:lnSpc>
             </a:pPr>
             <a:r>
-              <a:rPr b="1" lang="en-US" sz="810" spc="15" strike="noStrike">
+              <a:rPr b="1" lang="en-US" sz="1000" spc="15" strike="noStrike">
                 <a:solidFill>
                   <a:srgbClr val="000000"/>
                 </a:solidFill>
                 <a:latin typeface="Open Sans Bold"/>
-                <a:ea typeface="Open Sans Bold"/>
-              </a:rPr>
-              <a:t>HOW DOES THE WEB WORKS  ?</a:t>
-            </a:r>
-            <a:endParaRPr b="0" lang="fr-FR" sz="810" spc="-1" strike="noStrike">
-              <a:solidFill>
-                <a:srgbClr val="000000"/>
-              </a:solidFill>
-              <a:latin typeface="Arial"/>
+              </a:rPr>
+              <a:t>HOW DOES THE WEB WORKS?</a:t>
+            </a:r>
+            <a:endParaRPr b="1" lang="en-US" sz="1000" spc="15" strike="noStrike">
+              <a:solidFill>
+                <a:srgbClr val="000000"/>
+              </a:solidFill>
+              <a:latin typeface="Open Sans Bold"/>
+              <a:ea typeface="Open Sans Bold"/>
             </a:endParaRPr>
           </a:p>
         </p:txBody>
       </p:sp>
       <p:sp>
         <p:nvSpPr>
-          <p:cNvPr id="44" name="TextBox 17"/>
+          <p:cNvPr id="40" name="TextBox 17"/>
           <p:cNvSpPr/>
           <p:nvPr/>
         </p:nvSpPr>
@@ -3094,19 +2831,9 @@
                 <a:latin typeface="Open Sans Bold"/>
                 <a:ea typeface="Open Sans Bold"/>
               </a:rPr>
-              <a:t>WHY DID YOU CHOOSE TO LEARN WEB DEVELOPMENT</a:t>
-            </a:r>
-            <a:r>
-              <a:rPr b="1" lang="en-US" sz="810" spc="15" strike="noStrike">
-                <a:solidFill>
-                  <a:srgbClr val="000000"/>
-                </a:solidFill>
-                <a:latin typeface="Open Sans Bold"/>
-                <a:ea typeface="Open Sans Bold"/>
-              </a:rPr>
-              <a:t> ?</a:t>
-            </a:r>
-            <a:endParaRPr b="0" lang="fr-FR" sz="810" spc="-1" strike="noStrike">
+              <a:t>WHY DID I CHOOSE TO LEARN WEB DEVELOPMENT?</a:t>
+            </a:r>
+            <a:endParaRPr b="0" lang="fr-FR" sz="1000" spc="-1" strike="noStrike">
               <a:solidFill>
                 <a:srgbClr val="000000"/>
               </a:solidFill>
@@ -3117,7 +2844,7 @@
       </p:sp>
       <p:sp>
         <p:nvSpPr>
-          <p:cNvPr id="45" name="TextBox 20"/>
+          <p:cNvPr id="41" name="TextBox 20"/>
           <p:cNvSpPr/>
           <p:nvPr/>
         </p:nvSpPr>
@@ -3171,7 +2898,7 @@
       </p:sp>
       <p:grpSp>
         <p:nvGrpSpPr>
-          <p:cNvPr id="46" name="Group 10"/>
+          <p:cNvPr id="42" name="Group 10"/>
           <p:cNvGrpSpPr/>
           <p:nvPr/>
         </p:nvGrpSpPr>
@@ -3185,7 +2912,7 @@
         </p:grpSpPr>
         <p:sp>
           <p:nvSpPr>
-            <p:cNvPr id="47" name="Freeform 19"/>
+            <p:cNvPr id="43" name="Freeform 19"/>
             <p:cNvSpPr/>
             <p:nvPr/>
           </p:nvSpPr>
@@ -3251,7 +2978,7 @@
         </p:sp>
         <p:sp>
           <p:nvSpPr>
-            <p:cNvPr id="48" name="TextBox 22"/>
+            <p:cNvPr id="44" name="TextBox 22"/>
             <p:cNvSpPr/>
             <p:nvPr/>
           </p:nvSpPr>
@@ -3291,7 +3018,7 @@
       </p:grpSp>
       <p:sp>
         <p:nvSpPr>
-          <p:cNvPr id="49" name="Freeform 21"/>
+          <p:cNvPr id="45" name="Freeform 21"/>
           <p:cNvSpPr/>
           <p:nvPr/>
         </p:nvSpPr>
@@ -3332,7 +3059,7 @@
             </a:pathLst>
           </a:custGeom>
           <a:blipFill rotWithShape="0">
-            <a:blip r:embed="rId3"/>
+            <a:blip r:embed="rId2"/>
             <a:srcRect/>
             <a:stretch/>
           </a:blipFill>
@@ -3362,7 +3089,7 @@
       </p:sp>
       <p:sp>
         <p:nvSpPr>
-          <p:cNvPr id="50" name="TextBox 23"/>
+          <p:cNvPr id="46" name="TextBox 23"/>
           <p:cNvSpPr/>
           <p:nvPr/>
         </p:nvSpPr>
@@ -3403,19 +3130,9 @@
                 <a:latin typeface="Open Sans Bold"/>
                 <a:ea typeface="Open Sans Bold"/>
               </a:rPr>
-              <a:t>WHAT DO YOU NEED TO BE A WEB DEVELOPER</a:t>
-            </a:r>
-            <a:r>
-              <a:rPr b="1" lang="en-US" sz="810" spc="15" strike="noStrike">
-                <a:solidFill>
-                  <a:srgbClr val="000000"/>
-                </a:solidFill>
-                <a:latin typeface="Open Sans Bold"/>
-                <a:ea typeface="Open Sans Bold"/>
-              </a:rPr>
-              <a:t>?</a:t>
-            </a:r>
-            <a:endParaRPr b="0" lang="fr-FR" sz="810" spc="-1" strike="noStrike">
+              <a:t>WHAT DO I NEED TO BE A WEB DEVELOPER?</a:t>
+            </a:r>
+            <a:endParaRPr b="0" lang="fr-FR" sz="1000" spc="-1" strike="noStrike">
               <a:solidFill>
                 <a:srgbClr val="000000"/>
               </a:solidFill>
@@ -3426,7 +3143,7 @@
       </p:sp>
       <p:sp>
         <p:nvSpPr>
-          <p:cNvPr id="51" name="TextBox 24"/>
+          <p:cNvPr id="47" name="TextBox 24"/>
           <p:cNvSpPr/>
           <p:nvPr/>
         </p:nvSpPr>
@@ -3480,7 +3197,7 @@
       </p:sp>
       <p:sp>
         <p:nvSpPr>
-          <p:cNvPr id="52" name="TextBox 28"/>
+          <p:cNvPr id="48" name="TextBox 28"/>
           <p:cNvSpPr/>
           <p:nvPr/>
         </p:nvSpPr>
@@ -3534,7 +3251,7 @@
       </p:sp>
       <p:sp>
         <p:nvSpPr>
-          <p:cNvPr id="53" name="AutoShape 2"/>
+          <p:cNvPr id="49" name="AutoShape 2"/>
           <p:cNvSpPr/>
           <p:nvPr/>
         </p:nvSpPr>
@@ -3575,7 +3292,7 @@
       </p:sp>
       <p:sp>
         <p:nvSpPr>
-          <p:cNvPr id="54" name="Freeform 28"/>
+          <p:cNvPr id="50" name="Freeform 28"/>
           <p:cNvSpPr/>
           <p:nvPr/>
         </p:nvSpPr>
@@ -3616,7 +3333,7 @@
             </a:pathLst>
           </a:custGeom>
           <a:blipFill rotWithShape="0">
-            <a:blip r:embed="rId4"/>
+            <a:blip r:embed="rId3"/>
             <a:srcRect/>
             <a:stretch/>
           </a:blipFill>
@@ -3644,6 +3361,29 @@
           </a:p>
         </p:txBody>
       </p:sp>
+      <p:pic>
+        <p:nvPicPr>
+          <p:cNvPr id="51" name="" descr=""/>
+          <p:cNvPicPr/>
+          <p:nvPr/>
+        </p:nvPicPr>
+        <p:blipFill>
+          <a:blip r:embed="rId4"/>
+          <a:stretch/>
+        </p:blipFill>
+        <p:spPr>
+          <a:xfrm>
+            <a:off x="2518200" y="1644480"/>
+            <a:ext cx="1605960" cy="1287360"/>
+          </a:xfrm>
+          <a:prstGeom prst="rect">
+            <a:avLst/>
+          </a:prstGeom>
+          <a:ln w="0">
+            <a:noFill/>
+          </a:ln>
+        </p:spPr>
+      </p:pic>
     </p:spTree>
   </p:cSld>
   <mc:AlternateContent>
@@ -3657,7 +3397,7 @@
 </p:sld>
 </file>
 
-<file path=ppt/slides/slide4.xml><?xml version="1.0" encoding="utf-8"?>
+<file path=ppt/slides/slide3.xml><?xml version="1.0" encoding="utf-8"?>
 <p:sld xmlns:a="http://schemas.openxmlformats.org/drawingml/2006/main" xmlns:p="http://schemas.openxmlformats.org/presentationml/2006/main" xmlns:r="http://schemas.openxmlformats.org/officeDocument/2006/relationships" xmlns:p14="http://schemas.microsoft.com/office/powerpoint/2010/main" xmlns:p15="http://schemas.microsoft.com/office/powerpoint/2012/main" xmlns:mc="http://schemas.openxmlformats.org/markup-compatibility/2006">
   <p:cSld>
     <p:bg>
@@ -3683,7 +3423,7 @@
       </p:grpSpPr>
       <p:sp>
         <p:nvSpPr>
-          <p:cNvPr id="55" name="Freeform 5"/>
+          <p:cNvPr id="52" name="Freeform 8"/>
           <p:cNvSpPr/>
           <p:nvPr/>
         </p:nvSpPr>
@@ -3760,7 +3500,7 @@
       </p:sp>
       <p:grpSp>
         <p:nvGrpSpPr>
-          <p:cNvPr id="56" name="Group 4"/>
+          <p:cNvPr id="53" name="Group 6"/>
           <p:cNvGrpSpPr/>
           <p:nvPr/>
         </p:nvGrpSpPr>
@@ -3774,7 +3514,7 @@
         </p:grpSpPr>
         <p:sp>
           <p:nvSpPr>
-            <p:cNvPr id="57" name="Freeform 7"/>
+            <p:cNvPr id="54" name="Freeform 10"/>
             <p:cNvSpPr/>
             <p:nvPr/>
           </p:nvSpPr>
@@ -3915,7 +3655,7 @@
       </p:grpSp>
       <p:sp>
         <p:nvSpPr>
-          <p:cNvPr id="58" name="TextBox 8"/>
+          <p:cNvPr id="55" name="TextBox 9"/>
           <p:cNvSpPr/>
           <p:nvPr/>
         </p:nvSpPr>
@@ -3956,7 +3696,7 @@
                 <a:latin typeface="Liberation Sans Bold"/>
                 <a:ea typeface="Liberation Sans Bold"/>
               </a:rPr>
-              <a:t>1. </a:t>
+              <a:t>I. </a:t>
             </a:r>
             <a:r>
               <a:rPr b="1" lang="en-US" sz="2000" spc="15" strike="noStrike">
@@ -3966,17 +3706,7 @@
                 <a:latin typeface="Open Sans Bold"/>
                 <a:ea typeface="Open Sans Bold"/>
               </a:rPr>
-              <a:t>HOW DOES </a:t>
-            </a:r>
-            <a:r>
-              <a:rPr b="1" lang="en-US" sz="2000" spc="15" strike="noStrike">
-                <a:solidFill>
-                  <a:srgbClr val="ffffff"/>
-                </a:solidFill>
-                <a:latin typeface="Open Sans Bold"/>
-                <a:ea typeface="Open Sans Bold"/>
-              </a:rPr>
-              <a:t>THE WEB </a:t>
+              <a:t>HOW DOES THE WEB </a:t>
             </a:r>
             <a:r>
               <a:rPr b="1" lang="en-US" sz="2000" spc="15" strike="noStrike">
@@ -4009,14 +3739,14 @@
       </p:sp>
       <p:sp>
         <p:nvSpPr>
-          <p:cNvPr id="59" name="TextBox 14"/>
+          <p:cNvPr id="56" name="TextBox 13"/>
           <p:cNvSpPr/>
           <p:nvPr/>
         </p:nvSpPr>
         <p:spPr>
           <a:xfrm>
-            <a:off x="464400" y="1528560"/>
-            <a:ext cx="4848840" cy="178200"/>
+            <a:off x="464400" y="844560"/>
+            <a:ext cx="5727600" cy="4426920"/>
           </a:xfrm>
           <a:prstGeom prst="rect">
             <a:avLst/>
@@ -4037,6 +3767,720 @@
             <a:spAutoFit/>
           </a:bodyPr>
           <a:p>
+            <a:pPr algn="just"/>
+            <a:r>
+              <a:rPr b="0" lang="en-US" sz="1000" spc="-1" strike="noStrike">
+                <a:solidFill>
+                  <a:srgbClr val="ffffff"/>
+                </a:solidFill>
+                <a:latin typeface="Arial"/>
+                <a:ea typeface="Arial"/>
+              </a:rPr>
+              <a:t>The web, or World Wide Web (WWW), is a system of interconnected documents and resources that are accessed over the internet. It works through a combination of technologies and protocols that allow users to retrieve and view information stored on servers. Here's a breakdown of how the web works:</a:t>
+            </a:r>
+            <a:endParaRPr b="0" lang="en-US" sz="1000" spc="-1" strike="noStrike">
+              <a:solidFill>
+                <a:srgbClr val="ffffff"/>
+              </a:solidFill>
+              <a:latin typeface="Arial"/>
+            </a:endParaRPr>
+          </a:p>
+          <a:p>
+            <a:pPr algn="just"/>
+            <a:endParaRPr b="0" lang="en-US" sz="1000" spc="-1" strike="noStrike">
+              <a:solidFill>
+                <a:srgbClr val="ffffff"/>
+              </a:solidFill>
+              <a:latin typeface="Arial"/>
+            </a:endParaRPr>
+          </a:p>
+          <a:p>
+            <a:pPr algn="just"/>
+            <a:r>
+              <a:rPr b="0" lang="en-US" sz="1000" spc="-1" strike="noStrike">
+                <a:solidFill>
+                  <a:srgbClr val="ffffff"/>
+                </a:solidFill>
+                <a:latin typeface="Arial"/>
+                <a:ea typeface="Arial"/>
+              </a:rPr>
+              <a:t>1. Key Components of the Web</a:t>
+            </a:r>
+            <a:endParaRPr b="0" lang="en-US" sz="1000" spc="-1" strike="noStrike">
+              <a:solidFill>
+                <a:srgbClr val="ffffff"/>
+              </a:solidFill>
+              <a:latin typeface="Arial"/>
+            </a:endParaRPr>
+          </a:p>
+          <a:p>
+            <a:pPr algn="just"/>
+            <a:r>
+              <a:rPr b="0" lang="en-US" sz="1000" spc="-1" strike="noStrike">
+                <a:solidFill>
+                  <a:srgbClr val="ffffff"/>
+                </a:solidFill>
+                <a:latin typeface="Arial"/>
+                <a:ea typeface="Arial"/>
+              </a:rPr>
+              <a:t>The web relies on the following key components:</a:t>
+            </a:r>
+            <a:endParaRPr b="0" lang="en-US" sz="1000" spc="-1" strike="noStrike">
+              <a:solidFill>
+                <a:srgbClr val="ffffff"/>
+              </a:solidFill>
+              <a:latin typeface="Arial"/>
+            </a:endParaRPr>
+          </a:p>
+          <a:p>
+            <a:pPr algn="just"/>
+            <a:endParaRPr b="0" lang="fr-FR" sz="1000" spc="-1" strike="noStrike">
+              <a:solidFill>
+                <a:srgbClr val="ffffff"/>
+              </a:solidFill>
+              <a:latin typeface="Arial"/>
+            </a:endParaRPr>
+          </a:p>
+          <a:p>
+            <a:pPr marL="450360" algn="just"/>
+            <a:r>
+              <a:rPr b="0" lang="en-US" sz="1000" spc="-1" strike="noStrike">
+                <a:solidFill>
+                  <a:srgbClr val="ffffff"/>
+                </a:solidFill>
+                <a:latin typeface="Arial"/>
+                <a:ea typeface="Arial"/>
+              </a:rPr>
+              <a:t>a. Clients (Web Browsers)</a:t>
+            </a:r>
+            <a:endParaRPr b="0" lang="en-US" sz="1000" spc="-1" strike="noStrike">
+              <a:solidFill>
+                <a:srgbClr val="ffffff"/>
+              </a:solidFill>
+              <a:latin typeface="Arial"/>
+            </a:endParaRPr>
+          </a:p>
+          <a:p>
+            <a:pPr marL="900360" algn="just"/>
+            <a:r>
+              <a:rPr b="0" lang="en-US" sz="1000" spc="-1" strike="noStrike">
+                <a:solidFill>
+                  <a:srgbClr val="ffffff"/>
+                </a:solidFill>
+                <a:latin typeface="Arial"/>
+                <a:ea typeface="Arial"/>
+              </a:rPr>
+              <a:t>- Clients are devices (e.g., computers, smartphones) that users use to access the web.</a:t>
+            </a:r>
+            <a:endParaRPr b="0" lang="en-US" sz="1000" spc="-1" strike="noStrike">
+              <a:solidFill>
+                <a:srgbClr val="ffffff"/>
+              </a:solidFill>
+              <a:latin typeface="Arial"/>
+            </a:endParaRPr>
+          </a:p>
+          <a:p>
+            <a:pPr marL="900360" algn="just"/>
+            <a:r>
+              <a:rPr b="0" lang="en-US" sz="1000" spc="-1" strike="noStrike">
+                <a:solidFill>
+                  <a:srgbClr val="ffffff"/>
+                </a:solidFill>
+                <a:latin typeface="Arial"/>
+                <a:ea typeface="Arial"/>
+              </a:rPr>
+              <a:t>- Web browsers (e.g., Chrome, Firefox, Safari) are software applications that retrieve and display web pages.</a:t>
+            </a:r>
+            <a:endParaRPr b="0" lang="en-US" sz="1000" spc="-1" strike="noStrike">
+              <a:solidFill>
+                <a:srgbClr val="ffffff"/>
+              </a:solidFill>
+              <a:latin typeface="Arial"/>
+            </a:endParaRPr>
+          </a:p>
+          <a:p>
+            <a:pPr marL="450360" algn="just"/>
+            <a:endParaRPr b="0" lang="fr-FR" sz="1000" spc="-1" strike="noStrike">
+              <a:solidFill>
+                <a:srgbClr val="ffffff"/>
+              </a:solidFill>
+              <a:latin typeface="Arial"/>
+            </a:endParaRPr>
+          </a:p>
+          <a:p>
+            <a:pPr marL="450360" algn="just"/>
+            <a:r>
+              <a:rPr b="0" lang="en-US" sz="1000" spc="-1" strike="noStrike">
+                <a:solidFill>
+                  <a:srgbClr val="ffffff"/>
+                </a:solidFill>
+                <a:latin typeface="Arial"/>
+                <a:ea typeface="Arial"/>
+              </a:rPr>
+              <a:t>b. Servers</a:t>
+            </a:r>
+            <a:endParaRPr b="0" lang="fr-FR" sz="1000" spc="-1" strike="noStrike">
+              <a:solidFill>
+                <a:srgbClr val="ffffff"/>
+              </a:solidFill>
+              <a:latin typeface="Arial"/>
+            </a:endParaRPr>
+          </a:p>
+          <a:p>
+            <a:pPr marL="900360" algn="just"/>
+            <a:r>
+              <a:rPr b="0" lang="en-US" sz="1000" spc="-1" strike="noStrike">
+                <a:solidFill>
+                  <a:srgbClr val="ffffff"/>
+                </a:solidFill>
+                <a:latin typeface="Arial"/>
+                <a:ea typeface="Arial"/>
+              </a:rPr>
+              <a:t>- Servers are special computers that store and deliver web pages and other resources (e.g., images, videos) to clients.</a:t>
+            </a:r>
+            <a:endParaRPr b="0" lang="en-US" sz="1000" spc="-1" strike="noStrike">
+              <a:solidFill>
+                <a:srgbClr val="ffffff"/>
+              </a:solidFill>
+              <a:latin typeface="Arial"/>
+            </a:endParaRPr>
+          </a:p>
+          <a:p>
+            <a:pPr marL="900360" algn="just"/>
+            <a:r>
+              <a:rPr b="0" lang="en-US" sz="1000" spc="-1" strike="noStrike">
+                <a:solidFill>
+                  <a:srgbClr val="ffffff"/>
+                </a:solidFill>
+                <a:latin typeface="Arial"/>
+                <a:ea typeface="Arial"/>
+              </a:rPr>
+              <a:t>- When a user requests a web page, the server processes the request and sends the appropriate files.</a:t>
+            </a:r>
+            <a:endParaRPr b="0" lang="en-US" sz="1000" spc="-1" strike="noStrike">
+              <a:solidFill>
+                <a:srgbClr val="ffffff"/>
+              </a:solidFill>
+              <a:latin typeface="Arial"/>
+            </a:endParaRPr>
+          </a:p>
+          <a:p>
+            <a:pPr algn="just"/>
+            <a:endParaRPr b="0" lang="fr-FR" sz="1000" spc="-1" strike="noStrike">
+              <a:solidFill>
+                <a:srgbClr val="ffffff"/>
+              </a:solidFill>
+              <a:latin typeface="Arial"/>
+            </a:endParaRPr>
+          </a:p>
+          <a:p>
+            <a:pPr marL="450360" algn="just"/>
+            <a:r>
+              <a:rPr b="0" lang="en-US" sz="1000" spc="-1" strike="noStrike">
+                <a:solidFill>
+                  <a:srgbClr val="ffffff"/>
+                </a:solidFill>
+                <a:latin typeface="Arial"/>
+                <a:ea typeface="Arial"/>
+              </a:rPr>
+              <a:t>c. Internet</a:t>
+            </a:r>
+            <a:endParaRPr b="0" lang="fr-FR" sz="1000" spc="-1" strike="noStrike">
+              <a:solidFill>
+                <a:srgbClr val="ffffff"/>
+              </a:solidFill>
+              <a:latin typeface="Arial"/>
+            </a:endParaRPr>
+          </a:p>
+          <a:p>
+            <a:pPr marL="900360" algn="just"/>
+            <a:r>
+              <a:rPr b="0" lang="en-US" sz="1000" spc="-1" strike="noStrike">
+                <a:solidFill>
+                  <a:srgbClr val="ffffff"/>
+                </a:solidFill>
+                <a:latin typeface="Arial"/>
+                <a:ea typeface="Arial"/>
+              </a:rPr>
+              <a:t>- The internet is the global network that connects clients and servers.</a:t>
+            </a:r>
+            <a:endParaRPr b="0" lang="en-US" sz="1000" spc="-1" strike="noStrike">
+              <a:solidFill>
+                <a:srgbClr val="ffffff"/>
+              </a:solidFill>
+              <a:latin typeface="Arial"/>
+            </a:endParaRPr>
+          </a:p>
+          <a:p>
+            <a:pPr marL="900360" algn="just"/>
+            <a:r>
+              <a:rPr b="0" lang="en-US" sz="1000" spc="-1" strike="noStrike">
+                <a:solidFill>
+                  <a:srgbClr val="ffffff"/>
+                </a:solidFill>
+                <a:latin typeface="Arial"/>
+                <a:ea typeface="Arial"/>
+              </a:rPr>
+              <a:t>- It allows data to be transmitted between devices using standardized protocols.</a:t>
+            </a:r>
+            <a:endParaRPr b="0" lang="en-US" sz="1000" spc="-1" strike="noStrike">
+              <a:solidFill>
+                <a:srgbClr val="ffffff"/>
+              </a:solidFill>
+              <a:latin typeface="Arial"/>
+            </a:endParaRPr>
+          </a:p>
+          <a:p>
+            <a:pPr marL="450360" algn="just"/>
+            <a:endParaRPr b="0" lang="fr-FR" sz="1000" spc="-1" strike="noStrike">
+              <a:solidFill>
+                <a:srgbClr val="ffffff"/>
+              </a:solidFill>
+              <a:latin typeface="Arial"/>
+            </a:endParaRPr>
+          </a:p>
+          <a:p>
+            <a:pPr marL="450360" algn="just"/>
+            <a:r>
+              <a:rPr b="0" lang="en-US" sz="1000" spc="-1" strike="noStrike">
+                <a:solidFill>
+                  <a:srgbClr val="ffffff"/>
+                </a:solidFill>
+                <a:latin typeface="Arial"/>
+                <a:ea typeface="Arial"/>
+              </a:rPr>
+              <a:t>d. Protocols</a:t>
+            </a:r>
+            <a:endParaRPr b="0" lang="fr-FR" sz="1000" spc="-1" strike="noStrike">
+              <a:solidFill>
+                <a:srgbClr val="ffffff"/>
+              </a:solidFill>
+              <a:latin typeface="Arial"/>
+            </a:endParaRPr>
+          </a:p>
+          <a:p>
+            <a:pPr marL="900360" algn="just"/>
+            <a:r>
+              <a:rPr b="0" lang="en-US" sz="1000" spc="-1" strike="noStrike">
+                <a:solidFill>
+                  <a:srgbClr val="ffffff"/>
+                </a:solidFill>
+                <a:latin typeface="Arial"/>
+                <a:ea typeface="Arial"/>
+              </a:rPr>
+              <a:t>- Protocols are rules that govern how data is transmitted and received over the internet.</a:t>
+            </a:r>
+            <a:endParaRPr b="0" lang="en-US" sz="1000" spc="-1" strike="noStrike">
+              <a:solidFill>
+                <a:srgbClr val="ffffff"/>
+              </a:solidFill>
+              <a:latin typeface="Arial"/>
+            </a:endParaRPr>
+          </a:p>
+          <a:p>
+            <a:pPr marL="900360" algn="just"/>
+            <a:r>
+              <a:rPr b="0" lang="en-US" sz="1000" spc="-1" strike="noStrike">
+                <a:solidFill>
+                  <a:srgbClr val="ffffff"/>
+                </a:solidFill>
+                <a:latin typeface="Arial"/>
+                <a:ea typeface="Arial"/>
+              </a:rPr>
+              <a:t>- The most important protocol for the web is HTTP/HTTPS (Hypertext Transfer Protocol/Secure).</a:t>
+            </a:r>
+            <a:endParaRPr b="0" lang="en-US" sz="1000" spc="-1" strike="noStrike">
+              <a:solidFill>
+                <a:srgbClr val="ffffff"/>
+              </a:solidFill>
+              <a:latin typeface="Arial"/>
+            </a:endParaRPr>
+          </a:p>
+        </p:txBody>
+      </p:sp>
+    </p:spTree>
+  </p:cSld>
+  <mc:AlternateContent>
+    <mc:Choice Requires="p14">
+      <p:transition spd="slow" p14:dur="2000"/>
+    </mc:Choice>
+    <mc:Fallback>
+      <p:transition spd="slow"/>
+    </mc:Fallback>
+  </mc:AlternateContent>
+</p:sld>
+</file>
+
+<file path=ppt/slides/slide4.xml><?xml version="1.0" encoding="utf-8"?>
+<p:sld xmlns:a="http://schemas.openxmlformats.org/drawingml/2006/main" xmlns:p="http://schemas.openxmlformats.org/presentationml/2006/main" xmlns:r="http://schemas.openxmlformats.org/officeDocument/2006/relationships" xmlns:p14="http://schemas.microsoft.com/office/powerpoint/2010/main" xmlns:p15="http://schemas.microsoft.com/office/powerpoint/2012/main" xmlns:mc="http://schemas.openxmlformats.org/markup-compatibility/2006">
+  <p:cSld>
+    <p:bg>
+      <p:bgPr>
+        <a:solidFill>
+          <a:srgbClr val="000000"/>
+        </a:solidFill>
+      </p:bgPr>
+    </p:bg>
+    <p:spTree>
+      <p:nvGrpSpPr>
+        <p:cNvPr id="1" name=""/>
+        <p:cNvGrpSpPr/>
+        <p:nvPr/>
+      </p:nvGrpSpPr>
+      <p:grpSpPr>
+        <a:xfrm>
+          <a:off x="0" y="0"/>
+          <a:ext cx="0" cy="0"/>
+          <a:chOff x="0" y="0"/>
+          <a:chExt cx="0" cy="0"/>
+        </a:xfrm>
+      </p:grpSpPr>
+      <p:sp>
+        <p:nvSpPr>
+          <p:cNvPr id="57" name="Freeform 5"/>
+          <p:cNvSpPr/>
+          <p:nvPr/>
+        </p:nvSpPr>
+        <p:spPr>
+          <a:xfrm>
+            <a:off x="6727680" y="0"/>
+            <a:ext cx="2415240" cy="5142600"/>
+          </a:xfrm>
+          <a:custGeom>
+            <a:avLst/>
+            <a:gdLst>
+              <a:gd name="textAreaLeft" fmla="*/ 0 w 2415240"/>
+              <a:gd name="textAreaRight" fmla="*/ 2415960 w 2415240"/>
+              <a:gd name="textAreaTop" fmla="*/ 0 h 5142600"/>
+              <a:gd name="textAreaBottom" fmla="*/ 5143320 h 5142600"/>
+            </a:gdLst>
+            <a:ahLst/>
+            <a:rect l="textAreaLeft" t="textAreaTop" r="textAreaRight" b="textAreaBottom"/>
+            <a:pathLst>
+              <a:path w="2415950" h="5143310">
+                <a:moveTo>
+                  <a:pt x="0" y="0"/>
+                </a:moveTo>
+                <a:lnTo>
+                  <a:pt x="2415950" y="0"/>
+                </a:lnTo>
+                <a:lnTo>
+                  <a:pt x="2415950" y="5143310"/>
+                </a:lnTo>
+                <a:lnTo>
+                  <a:pt x="0" y="5143310"/>
+                </a:lnTo>
+                <a:lnTo>
+                  <a:pt x="0" y="0"/>
+                </a:lnTo>
+                <a:close/>
+              </a:path>
+            </a:pathLst>
+          </a:custGeom>
+          <a:blipFill rotWithShape="0">
+            <a:blip r:embed="rId1">
+              <a:extLst>
+                <a:ext uri="{96DAC541-7B7A-43D3-8B79-37D633B846F1}">
+                  <asvg:svgBlip xmlns:asvg="http://schemas.microsoft.com/office/drawing/2016/SVG/main" r:embed="rId2"/>
+                </a:ext>
+              </a:extLst>
+            </a:blip>
+            <a:srcRect/>
+            <a:stretch/>
+          </a:blipFill>
+          <a:ln w="0">
+            <a:noFill/>
+          </a:ln>
+        </p:spPr>
+        <p:style>
+          <a:lnRef idx="0"/>
+          <a:fillRef idx="0"/>
+          <a:effectRef idx="0"/>
+          <a:fontRef idx="minor"/>
+        </p:style>
+        <p:txBody>
+          <a:bodyPr lIns="90000" rIns="90000" tIns="45000" bIns="45000" anchor="t">
+            <a:noAutofit/>
+          </a:bodyPr>
+          <a:p>
+            <a:endParaRPr b="0" lang="fr-FR" sz="1800" spc="-1" strike="noStrike">
+              <a:solidFill>
+                <a:srgbClr val="000000"/>
+              </a:solidFill>
+              <a:latin typeface="Arial"/>
+            </a:endParaRPr>
+          </a:p>
+        </p:txBody>
+      </p:sp>
+      <p:grpSp>
+        <p:nvGrpSpPr>
+          <p:cNvPr id="58" name="Group 4"/>
+          <p:cNvGrpSpPr/>
+          <p:nvPr/>
+        </p:nvGrpSpPr>
+        <p:grpSpPr>
+          <a:xfrm>
+            <a:off x="6040440" y="1172880"/>
+            <a:ext cx="2650320" cy="2649960"/>
+            <a:chOff x="6040440" y="1172880"/>
+            <a:chExt cx="2650320" cy="2649960"/>
+          </a:xfrm>
+        </p:grpSpPr>
+        <p:sp>
+          <p:nvSpPr>
+            <p:cNvPr id="59" name="Freeform 7"/>
+            <p:cNvSpPr/>
+            <p:nvPr/>
+          </p:nvSpPr>
+          <p:spPr>
+            <a:xfrm>
+              <a:off x="6040440" y="1172880"/>
+              <a:ext cx="2650320" cy="2649960"/>
+            </a:xfrm>
+            <a:custGeom>
+              <a:avLst/>
+              <a:gdLst>
+                <a:gd name="textAreaLeft" fmla="*/ 0 w 2650320"/>
+                <a:gd name="textAreaRight" fmla="*/ 2651040 w 2650320"/>
+                <a:gd name="textAreaTop" fmla="*/ 0 h 2649960"/>
+                <a:gd name="textAreaBottom" fmla="*/ 2650680 h 2649960"/>
+              </a:gdLst>
+              <a:ahLst/>
+              <a:rect l="textAreaLeft" t="textAreaTop" r="textAreaRight" b="textAreaBottom"/>
+              <a:pathLst>
+                <a:path w="3534791" h="3534410">
+                  <a:moveTo>
+                    <a:pt x="1767586" y="0"/>
+                  </a:moveTo>
+                  <a:cubicBezTo>
+                    <a:pt x="1457325" y="0"/>
+                    <a:pt x="1152525" y="81661"/>
+                    <a:pt x="883793" y="236855"/>
+                  </a:cubicBezTo>
+                  <a:cubicBezTo>
+                    <a:pt x="615061" y="392049"/>
+                    <a:pt x="391922" y="615061"/>
+                    <a:pt x="236855" y="883793"/>
+                  </a:cubicBezTo>
+                  <a:cubicBezTo>
+                    <a:pt x="82931" y="1150366"/>
+                    <a:pt x="1270" y="1452372"/>
+                    <a:pt x="0" y="1759966"/>
+                  </a:cubicBezTo>
+                  <a:lnTo>
+                    <a:pt x="0" y="1759966"/>
+                  </a:lnTo>
+                  <a:lnTo>
+                    <a:pt x="0" y="1775206"/>
+                  </a:lnTo>
+                  <a:lnTo>
+                    <a:pt x="0" y="1775206"/>
+                  </a:lnTo>
+                  <a:cubicBezTo>
+                    <a:pt x="1270" y="2082800"/>
+                    <a:pt x="82931" y="2384806"/>
+                    <a:pt x="236855" y="2651379"/>
+                  </a:cubicBezTo>
+                  <a:cubicBezTo>
+                    <a:pt x="392049" y="2920111"/>
+                    <a:pt x="615188" y="3143250"/>
+                    <a:pt x="883793" y="3298317"/>
+                  </a:cubicBezTo>
+                  <a:cubicBezTo>
+                    <a:pt x="1137793" y="3445002"/>
+                    <a:pt x="1424178" y="3526028"/>
+                    <a:pt x="1716913" y="3534410"/>
+                  </a:cubicBezTo>
+                  <a:lnTo>
+                    <a:pt x="1818386" y="3534410"/>
+                  </a:lnTo>
+                  <a:cubicBezTo>
+                    <a:pt x="2111121" y="3526028"/>
+                    <a:pt x="2397379" y="3445002"/>
+                    <a:pt x="2651506" y="3298317"/>
+                  </a:cubicBezTo>
+                  <a:cubicBezTo>
+                    <a:pt x="2920238" y="3143123"/>
+                    <a:pt x="3143377" y="2919984"/>
+                    <a:pt x="3298444" y="2651379"/>
+                  </a:cubicBezTo>
+                  <a:cubicBezTo>
+                    <a:pt x="3446780" y="2394458"/>
+                    <a:pt x="3527933" y="2104644"/>
+                    <a:pt x="3534791" y="1808480"/>
+                  </a:cubicBezTo>
+                  <a:lnTo>
+                    <a:pt x="3534791" y="1808480"/>
+                  </a:lnTo>
+                  <a:lnTo>
+                    <a:pt x="3534791" y="1726565"/>
+                  </a:lnTo>
+                  <a:lnTo>
+                    <a:pt x="3534791" y="1726565"/>
+                  </a:lnTo>
+                  <a:cubicBezTo>
+                    <a:pt x="3527933" y="1430528"/>
+                    <a:pt x="3446780" y="1140587"/>
+                    <a:pt x="3298444" y="883666"/>
+                  </a:cubicBezTo>
+                  <a:cubicBezTo>
+                    <a:pt x="3143250" y="614934"/>
+                    <a:pt x="2920111" y="391795"/>
+                    <a:pt x="2651506" y="236728"/>
+                  </a:cubicBezTo>
+                  <a:cubicBezTo>
+                    <a:pt x="2382901" y="81661"/>
+                    <a:pt x="2077847" y="0"/>
+                    <a:pt x="1767586" y="0"/>
+                  </a:cubicBezTo>
+                  <a:close/>
+                </a:path>
+              </a:pathLst>
+            </a:custGeom>
+            <a:blipFill rotWithShape="0">
+              <a:blip r:embed="rId3"/>
+              <a:srcRect/>
+              <a:stretch/>
+            </a:blipFill>
+            <a:ln w="0">
+              <a:noFill/>
+            </a:ln>
+          </p:spPr>
+          <p:style>
+            <a:lnRef idx="0"/>
+            <a:fillRef idx="0"/>
+            <a:effectRef idx="0"/>
+            <a:fontRef idx="minor"/>
+          </p:style>
+          <p:txBody>
+            <a:bodyPr lIns="90000" rIns="90000" tIns="45000" bIns="45000" anchor="t">
+              <a:noAutofit/>
+            </a:bodyPr>
+            <a:p>
+              <a:endParaRPr b="0" lang="fr-FR" sz="1800" spc="-1" strike="noStrike">
+                <a:solidFill>
+                  <a:srgbClr val="000000"/>
+                </a:solidFill>
+                <a:latin typeface="Arial"/>
+              </a:endParaRPr>
+            </a:p>
+          </p:txBody>
+        </p:sp>
+      </p:grpSp>
+      <p:sp>
+        <p:nvSpPr>
+          <p:cNvPr id="60" name="TextBox 8"/>
+          <p:cNvSpPr/>
+          <p:nvPr/>
+        </p:nvSpPr>
+        <p:spPr>
+          <a:xfrm>
+            <a:off x="297000" y="190080"/>
+            <a:ext cx="6075000" cy="244440"/>
+          </a:xfrm>
+          <a:prstGeom prst="rect">
+            <a:avLst/>
+          </a:prstGeom>
+          <a:noFill/>
+          <a:ln w="0">
+            <a:noFill/>
+          </a:ln>
+        </p:spPr>
+        <p:style>
+          <a:lnRef idx="0"/>
+          <a:fillRef idx="0"/>
+          <a:effectRef idx="0"/>
+          <a:fontRef idx="minor"/>
+        </p:style>
+        <p:txBody>
+          <a:bodyPr lIns="0" rIns="0" tIns="0" bIns="0" anchor="t">
+            <a:spAutoFit/>
+          </a:bodyPr>
+          <a:p>
+            <a:pPr defTabSz="914400">
+              <a:lnSpc>
+                <a:spcPts val="1922"/>
+              </a:lnSpc>
+            </a:pPr>
+            <a:r>
+              <a:rPr b="1" lang="en-US" sz="2000" spc="-1" strike="noStrike">
+                <a:solidFill>
+                  <a:srgbClr val="ffffff"/>
+                </a:solidFill>
+                <a:latin typeface="Liberation Sans Bold"/>
+                <a:ea typeface="Liberation Sans Bold"/>
+              </a:rPr>
+              <a:t>II. WHY DO I NEED TO BE A WEB </a:t>
+            </a:r>
+            <a:r>
+              <a:rPr b="1" lang="en-US" sz="2000" spc="-1" strike="noStrike">
+                <a:solidFill>
+                  <a:srgbClr val="ffffff"/>
+                </a:solidFill>
+                <a:latin typeface="Liberation Sans Bold"/>
+                <a:ea typeface="Liberation Sans Bold"/>
+              </a:rPr>
+              <a:t>DEVELOPER</a:t>
+            </a:r>
+            <a:r>
+              <a:rPr b="1" lang="en-US" sz="2000" spc="15" strike="noStrike">
+                <a:solidFill>
+                  <a:srgbClr val="ffffff"/>
+                </a:solidFill>
+                <a:latin typeface="Open Sans Bold"/>
+                <a:ea typeface="Open Sans Bold"/>
+              </a:rPr>
+              <a:t> ?</a:t>
+            </a:r>
+            <a:r>
+              <a:rPr b="1" lang="en-US" sz="2000" spc="-1" strike="noStrike">
+                <a:solidFill>
+                  <a:srgbClr val="ffffff"/>
+                </a:solidFill>
+                <a:latin typeface="Liberation Sans Bold"/>
+                <a:ea typeface="Liberation Sans Bold"/>
+              </a:rPr>
+              <a:t> </a:t>
+            </a:r>
+            <a:endParaRPr b="0" lang="fr-FR" sz="2000" spc="-1" strike="noStrike">
+              <a:solidFill>
+                <a:srgbClr val="ffffff"/>
+              </a:solidFill>
+              <a:latin typeface="Arial"/>
+            </a:endParaRPr>
+          </a:p>
+        </p:txBody>
+      </p:sp>
+      <p:sp>
+        <p:nvSpPr>
+          <p:cNvPr id="61" name="TextBox 14"/>
+          <p:cNvSpPr/>
+          <p:nvPr/>
+        </p:nvSpPr>
+        <p:spPr>
+          <a:xfrm>
+            <a:off x="360000" y="756000"/>
+            <a:ext cx="5359680" cy="711720"/>
+          </a:xfrm>
+          <a:prstGeom prst="rect">
+            <a:avLst/>
+          </a:prstGeom>
+          <a:noFill/>
+          <a:ln w="0">
+            <a:noFill/>
+          </a:ln>
+        </p:spPr>
+        <p:style>
+          <a:lnRef idx="0"/>
+          <a:fillRef idx="0"/>
+          <a:effectRef idx="0"/>
+          <a:fontRef idx="minor"/>
+        </p:style>
+        <p:txBody>
+          <a:bodyPr lIns="0" rIns="0" tIns="0" bIns="0" anchor="t">
+            <a:spAutoFit/>
+          </a:bodyPr>
+          <a:p>
             <a:pPr algn="just" defTabSz="914400">
               <a:lnSpc>
                 <a:spcPts val="1400"/>
@@ -4050,9 +4494,357 @@
                 <a:latin typeface="Arial"/>
                 <a:ea typeface="Arial"/>
               </a:rPr>
-              <a:t>Indeed, </a:t>
+              <a:t>As both a Financial Engineer and </a:t>
+            </a:r>
+            <a:r>
+              <a:rPr b="0" lang="en-US" sz="1000" spc="-1" strike="noStrike">
+                <a:solidFill>
+                  <a:srgbClr val="ffffff"/>
+                </a:solidFill>
+                <a:latin typeface="Arial"/>
+                <a:ea typeface="Arial"/>
+              </a:rPr>
+              <a:t>Consultant in Management to </a:t>
+            </a:r>
+            <a:r>
+              <a:rPr b="0" lang="en-US" sz="1000" spc="-1" strike="noStrike">
+                <a:solidFill>
+                  <a:srgbClr val="ffffff"/>
+                </a:solidFill>
+                <a:latin typeface="Arial"/>
+                <a:ea typeface="Arial"/>
+              </a:rPr>
+              <a:t>have strong skills in computer </a:t>
+            </a:r>
+            <a:r>
+              <a:rPr b="0" lang="en-US" sz="1000" spc="-1" strike="noStrike">
+                <a:solidFill>
+                  <a:srgbClr val="ffffff"/>
+                </a:solidFill>
+                <a:latin typeface="Arial"/>
+                <a:ea typeface="Arial"/>
+              </a:rPr>
+              <a:t>science, namely in software </a:t>
+            </a:r>
+            <a:r>
+              <a:rPr b="0" lang="en-US" sz="1000" spc="-1" strike="noStrike">
+                <a:solidFill>
+                  <a:srgbClr val="ffffff"/>
+                </a:solidFill>
+                <a:latin typeface="Arial"/>
+                <a:ea typeface="Arial"/>
+              </a:rPr>
+              <a:t>engineer a demand of modern </a:t>
+            </a:r>
+            <a:r>
+              <a:rPr b="0" lang="en-US" sz="1000" spc="-1" strike="noStrike">
+                <a:solidFill>
+                  <a:srgbClr val="ffffff"/>
+                </a:solidFill>
+                <a:latin typeface="Arial"/>
+                <a:ea typeface="Arial"/>
+              </a:rPr>
+              <a:t>our modern times. Therefore, </a:t>
+            </a:r>
+            <a:r>
+              <a:rPr b="0" lang="en-US" sz="1000" spc="-1" strike="noStrike">
+                <a:solidFill>
+                  <a:srgbClr val="ffffff"/>
+                </a:solidFill>
+                <a:latin typeface="Arial"/>
+                <a:ea typeface="Arial"/>
+              </a:rPr>
+              <a:t>continue to learn in the fields that </a:t>
+            </a:r>
+            <a:r>
+              <a:rPr b="0" lang="en-US" sz="1000" spc="-1" strike="noStrike">
+                <a:solidFill>
+                  <a:srgbClr val="ffffff"/>
+                </a:solidFill>
+                <a:latin typeface="Arial"/>
+                <a:ea typeface="Arial"/>
+              </a:rPr>
+              <a:t>can help me enhance the quality </a:t>
+            </a:r>
+            <a:r>
+              <a:rPr b="0" lang="en-US" sz="1000" spc="-1" strike="noStrike">
+                <a:solidFill>
+                  <a:srgbClr val="ffffff"/>
+                </a:solidFill>
+                <a:latin typeface="Arial"/>
+                <a:ea typeface="Arial"/>
+              </a:rPr>
+              <a:t>of what I have to deliver daily to </a:t>
+            </a:r>
+            <a:r>
+              <a:rPr b="0" lang="en-US" sz="1000" spc="-1" strike="noStrike">
+                <a:solidFill>
+                  <a:srgbClr val="ffffff"/>
+                </a:solidFill>
+                <a:latin typeface="Arial"/>
+                <a:ea typeface="Arial"/>
+              </a:rPr>
+              <a:t>my company is a very motivating </a:t>
+            </a:r>
+            <a:r>
+              <a:rPr b="0" lang="en-US" sz="1000" spc="-1" strike="noStrike">
+                <a:solidFill>
+                  <a:srgbClr val="ffffff"/>
+                </a:solidFill>
+                <a:latin typeface="Arial"/>
+                <a:ea typeface="Arial"/>
+              </a:rPr>
+              <a:t>for me.</a:t>
             </a:r>
             <a:endParaRPr b="0" lang="fr-FR" sz="1000" spc="-1" strike="noStrike">
+              <a:solidFill>
+                <a:srgbClr val="ffffff"/>
+              </a:solidFill>
+              <a:latin typeface="Arial"/>
+            </a:endParaRPr>
+          </a:p>
+        </p:txBody>
+      </p:sp>
+      <p:sp>
+        <p:nvSpPr>
+          <p:cNvPr id="62" name="TextBox 18"/>
+          <p:cNvSpPr/>
+          <p:nvPr/>
+        </p:nvSpPr>
+        <p:spPr>
+          <a:xfrm>
+            <a:off x="297000" y="2206080"/>
+            <a:ext cx="6687000" cy="244440"/>
+          </a:xfrm>
+          <a:prstGeom prst="rect">
+            <a:avLst/>
+          </a:prstGeom>
+          <a:noFill/>
+          <a:ln w="0">
+            <a:noFill/>
+          </a:ln>
+        </p:spPr>
+        <p:style>
+          <a:lnRef idx="0"/>
+          <a:fillRef idx="0"/>
+          <a:effectRef idx="0"/>
+          <a:fontRef idx="minor"/>
+        </p:style>
+        <p:txBody>
+          <a:bodyPr lIns="0" rIns="0" tIns="0" bIns="0" anchor="t">
+            <a:spAutoFit/>
+          </a:bodyPr>
+          <a:p>
+            <a:pPr defTabSz="914400">
+              <a:lnSpc>
+                <a:spcPts val="1922"/>
+              </a:lnSpc>
+            </a:pPr>
+            <a:r>
+              <a:rPr b="1" lang="en-US" sz="2000" spc="-1" strike="noStrike">
+                <a:solidFill>
+                  <a:srgbClr val="ffffff"/>
+                </a:solidFill>
+                <a:latin typeface="Liberation Sans Bold"/>
+                <a:ea typeface="Liberation Sans Bold"/>
+              </a:rPr>
+              <a:t>III. WHY DO I NEED CHOOSE WEB DEVELOPMENT</a:t>
+            </a:r>
+            <a:r>
+              <a:rPr b="1" lang="en-US" sz="2000" spc="15" strike="noStrike">
+                <a:solidFill>
+                  <a:srgbClr val="ffffff"/>
+                </a:solidFill>
+                <a:latin typeface="Open Sans Bold"/>
+                <a:ea typeface="Open Sans Bold"/>
+              </a:rPr>
+              <a:t> ?</a:t>
+            </a:r>
+            <a:r>
+              <a:rPr b="1" lang="en-US" sz="2000" spc="-1" strike="noStrike">
+                <a:solidFill>
+                  <a:srgbClr val="ffffff"/>
+                </a:solidFill>
+                <a:latin typeface="Liberation Sans Bold"/>
+                <a:ea typeface="Liberation Sans Bold"/>
+              </a:rPr>
+              <a:t> </a:t>
+            </a:r>
+            <a:endParaRPr b="0" lang="fr-FR" sz="2000" spc="-1" strike="noStrike">
+              <a:solidFill>
+                <a:srgbClr val="ffffff"/>
+              </a:solidFill>
+              <a:latin typeface="Arial"/>
+            </a:endParaRPr>
+          </a:p>
+        </p:txBody>
+      </p:sp>
+      <p:sp>
+        <p:nvSpPr>
+          <p:cNvPr id="63" name=""/>
+          <p:cNvSpPr txBox="1"/>
+          <p:nvPr/>
+        </p:nvSpPr>
+        <p:spPr>
+          <a:xfrm>
+            <a:off x="288000" y="2736000"/>
+            <a:ext cx="5904000" cy="533880"/>
+          </a:xfrm>
+          <a:prstGeom prst="rect">
+            <a:avLst/>
+          </a:prstGeom>
+          <a:noFill/>
+          <a:ln w="0">
+            <a:noFill/>
+          </a:ln>
+        </p:spPr>
+        <p:txBody>
+          <a:bodyPr lIns="0" rIns="0" tIns="0" bIns="0" anchor="t">
+            <a:noAutofit/>
+          </a:bodyPr>
+          <a:p>
+            <a:pPr algn="just" defTabSz="914400">
+              <a:lnSpc>
+                <a:spcPts val="1400"/>
+              </a:lnSpc>
+            </a:pPr>
+            <a:r>
+              <a:rPr b="0" lang="en-US" sz="1000" spc="-1" strike="noStrike">
+                <a:solidFill>
+                  <a:srgbClr val="ffffff"/>
+                </a:solidFill>
+                <a:latin typeface="Arial"/>
+              </a:rPr>
+              <a:t>My passion for web development comes from my first days as an employee in a web agency. At that time in the 2000s, I discovered HTML and since then I have always been fascinated by it without being able to master it, this program of  Master of computer Science is a great opportunity for me.</a:t>
+            </a:r>
+            <a:endParaRPr b="0" lang="en-US" sz="1000" spc="-1" strike="noStrike">
+              <a:solidFill>
+                <a:srgbClr val="ffffff"/>
+              </a:solidFill>
+              <a:latin typeface="Arial"/>
+              <a:ea typeface="Arial"/>
+            </a:endParaRPr>
+          </a:p>
+        </p:txBody>
+      </p:sp>
+      <p:sp>
+        <p:nvSpPr>
+          <p:cNvPr id="64" name=""/>
+          <p:cNvSpPr txBox="1"/>
+          <p:nvPr/>
+        </p:nvSpPr>
+        <p:spPr>
+          <a:xfrm>
+            <a:off x="216000" y="4104000"/>
+            <a:ext cx="6322320" cy="374040"/>
+          </a:xfrm>
+          <a:prstGeom prst="rect">
+            <a:avLst/>
+          </a:prstGeom>
+          <a:noFill/>
+          <a:ln w="0">
+            <a:noFill/>
+          </a:ln>
+        </p:spPr>
+        <p:txBody>
+          <a:bodyPr wrap="none" lIns="90000" rIns="90000" tIns="45000" bIns="45000" anchor="t">
+            <a:noAutofit/>
+          </a:bodyPr>
+          <a:p>
+            <a:pPr algn="just"/>
+            <a:r>
+              <a:rPr b="0" lang="en-US" sz="1000" spc="-1" strike="noStrike">
+                <a:solidFill>
+                  <a:srgbClr val="ffffff"/>
+                </a:solidFill>
+                <a:latin typeface="Arial"/>
+                <a:ea typeface="Noto Sans CJK SC"/>
+              </a:rPr>
+              <a:t>In summary, the web works through a combination of clients, servers, protocols, and technologies that enable </a:t>
+            </a:r>
+            <a:endParaRPr b="0" lang="en-US" sz="1000" spc="-1" strike="noStrike">
+              <a:solidFill>
+                <a:srgbClr val="ffffff"/>
+              </a:solidFill>
+              <a:latin typeface="Arial"/>
+            </a:endParaRPr>
+          </a:p>
+          <a:p>
+            <a:pPr algn="just"/>
+            <a:r>
+              <a:rPr b="0" lang="en-US" sz="1000" spc="-1" strike="noStrike">
+                <a:solidFill>
+                  <a:srgbClr val="ffffff"/>
+                </a:solidFill>
+                <a:latin typeface="Arial"/>
+                <a:ea typeface="Noto Sans CJK SC"/>
+              </a:rPr>
+              <a:t>users to access and interact with information stored on the internet. </a:t>
+            </a:r>
+            <a:endParaRPr b="0" lang="en-US" sz="1000" spc="-1" strike="noStrike">
+              <a:solidFill>
+                <a:srgbClr val="ffffff"/>
+              </a:solidFill>
+              <a:latin typeface="Arial"/>
+            </a:endParaRPr>
+          </a:p>
+        </p:txBody>
+      </p:sp>
+      <p:sp>
+        <p:nvSpPr>
+          <p:cNvPr id="65" name="TextBox 19"/>
+          <p:cNvSpPr/>
+          <p:nvPr/>
+        </p:nvSpPr>
+        <p:spPr>
+          <a:xfrm>
+            <a:off x="297000" y="3718080"/>
+            <a:ext cx="6687000" cy="244440"/>
+          </a:xfrm>
+          <a:prstGeom prst="rect">
+            <a:avLst/>
+          </a:prstGeom>
+          <a:noFill/>
+          <a:ln w="0">
+            <a:noFill/>
+          </a:ln>
+        </p:spPr>
+        <p:style>
+          <a:lnRef idx="0"/>
+          <a:fillRef idx="0"/>
+          <a:effectRef idx="0"/>
+          <a:fontRef idx="minor"/>
+        </p:style>
+        <p:txBody>
+          <a:bodyPr lIns="0" rIns="0" tIns="0" bIns="0" anchor="t">
+            <a:spAutoFit/>
+          </a:bodyPr>
+          <a:p>
+            <a:pPr defTabSz="914400">
+              <a:lnSpc>
+                <a:spcPts val="1922"/>
+              </a:lnSpc>
+            </a:pPr>
+            <a:r>
+              <a:rPr b="1" lang="en-US" sz="2000" spc="-1" strike="noStrike">
+                <a:solidFill>
+                  <a:srgbClr val="ffffff"/>
+                </a:solidFill>
+                <a:latin typeface="Liberation Sans Bold"/>
+              </a:rPr>
+              <a:t>CONCLUSION</a:t>
+            </a:r>
+            <a:r>
+              <a:rPr b="1" lang="en-US" sz="2000" spc="-1" strike="noStrike">
+                <a:solidFill>
+                  <a:srgbClr val="ffffff"/>
+                </a:solidFill>
+                <a:latin typeface="Liberation Sans Bold"/>
+                <a:ea typeface="Liberation Sans Bold"/>
+              </a:rPr>
+              <a:t> </a:t>
+            </a:r>
+            <a:endParaRPr b="0" lang="fr-FR" sz="2000" spc="-1" strike="noStrike">
               <a:solidFill>
                 <a:srgbClr val="ffffff"/>
               </a:solidFill>
@@ -4091,132 +4883,29 @@
           <a:chExt cx="0" cy="0"/>
         </a:xfrm>
       </p:grpSpPr>
-      <p:sp>
-        <p:nvSpPr>
-          <p:cNvPr id="60" name=""/>
-          <p:cNvSpPr txBox="1"/>
+      <p:pic>
+        <p:nvPicPr>
+          <p:cNvPr id="66" name="" descr=""/>
+          <p:cNvPicPr/>
           <p:nvPr/>
-        </p:nvSpPr>
+        </p:nvPicPr>
+        <p:blipFill>
+          <a:blip r:embed="rId1"/>
+          <a:stretch/>
+        </p:blipFill>
         <p:spPr>
           <a:xfrm>
-            <a:off x="104400" y="1413000"/>
-            <a:ext cx="9946440" cy="2888640"/>
+            <a:off x="108360" y="492480"/>
+            <a:ext cx="10043640" cy="4835520"/>
           </a:xfrm>
           <a:prstGeom prst="rect">
             <a:avLst/>
           </a:prstGeom>
-          <a:noFill/>
           <a:ln w="0">
             <a:noFill/>
           </a:ln>
         </p:spPr>
-        <p:txBody>
-          <a:bodyPr lIns="90000" rIns="90000" tIns="45000" bIns="45000" anchor="t">
-            <a:noAutofit/>
-          </a:bodyPr>
-          <a:p>
-            <a:endParaRPr b="0" lang="fr-FR" sz="1000" spc="-1" strike="noStrike">
-              <a:solidFill>
-                <a:srgbClr val="000000"/>
-              </a:solidFill>
-              <a:latin typeface="Arial"/>
-            </a:endParaRPr>
-          </a:p>
-          <a:p>
-            <a:r>
-              <a:rPr b="0" lang="en-US" sz="1000" spc="-1" strike="noStrike">
-                <a:solidFill>
-                  <a:srgbClr val="000000"/>
-                </a:solidFill>
-                <a:latin typeface="Arial"/>
-              </a:rPr>
-              <a:t>In this checkpoint, you are going to create a presentation (max 5 slides) where you will explain the following subjects:</a:t>
-            </a:r>
-            <a:endParaRPr b="0" lang="fr-FR" sz="1000" spc="-1" strike="noStrike">
-              <a:solidFill>
-                <a:srgbClr val="000000"/>
-              </a:solidFill>
-              <a:latin typeface="Arial"/>
-            </a:endParaRPr>
-          </a:p>
-          <a:p>
-            <a:r>
-              <a:rPr b="0" lang="en-US" sz="1000" spc="-1" strike="noStrike">
-                <a:solidFill>
-                  <a:srgbClr val="000000"/>
-                </a:solidFill>
-                <a:latin typeface="Arial"/>
-              </a:rPr>
-              <a:t>How does the web work?</a:t>
-            </a:r>
-            <a:endParaRPr b="0" lang="fr-FR" sz="1000" spc="-1" strike="noStrike">
-              <a:solidFill>
-                <a:srgbClr val="000000"/>
-              </a:solidFill>
-              <a:latin typeface="Arial"/>
-            </a:endParaRPr>
-          </a:p>
-          <a:p>
-            <a:r>
-              <a:rPr b="0" lang="en-US" sz="1000" spc="-1" strike="noStrike">
-                <a:solidFill>
-                  <a:srgbClr val="000000"/>
-                </a:solidFill>
-                <a:latin typeface="Arial"/>
-              </a:rPr>
-              <a:t>What do you need to be a web developer?</a:t>
-            </a:r>
-            <a:endParaRPr b="0" lang="fr-FR" sz="1000" spc="-1" strike="noStrike">
-              <a:solidFill>
-                <a:srgbClr val="000000"/>
-              </a:solidFill>
-              <a:latin typeface="Arial"/>
-            </a:endParaRPr>
-          </a:p>
-          <a:p>
-            <a:r>
-              <a:rPr b="0" lang="en-US" sz="1000" spc="-1" strike="noStrike">
-                <a:solidFill>
-                  <a:srgbClr val="000000"/>
-                </a:solidFill>
-                <a:latin typeface="Arial"/>
-              </a:rPr>
-              <a:t>Why did you choose to learn web development?</a:t>
-            </a:r>
-            <a:endParaRPr b="0" lang="fr-FR" sz="1000" spc="-1" strike="noStrike">
-              <a:solidFill>
-                <a:srgbClr val="000000"/>
-              </a:solidFill>
-              <a:latin typeface="Arial"/>
-            </a:endParaRPr>
-          </a:p>
-          <a:p>
-            <a:r>
-              <a:rPr b="0" lang="en-US" sz="1000" spc="-1" strike="noStrike">
-                <a:solidFill>
-                  <a:srgbClr val="000000"/>
-                </a:solidFill>
-                <a:latin typeface="Arial"/>
-              </a:rPr>
-              <a:t>Hint: The purpose of this presentation is not to copy-paste information from the Internet but to learn how to research, ask precise questions, and find the best answers. In other words, the goal here is to learn how to learn.</a:t>
-            </a:r>
-            <a:endParaRPr b="0" lang="fr-FR" sz="1000" spc="-1" strike="noStrike">
-              <a:solidFill>
-                <a:srgbClr val="000000"/>
-              </a:solidFill>
-              <a:latin typeface="Arial"/>
-            </a:endParaRPr>
-          </a:p>
-          <a:p>
-            <a:endParaRPr b="0" lang="fr-FR" sz="1000" spc="-1" strike="noStrike">
-              <a:solidFill>
-                <a:srgbClr val="000000"/>
-              </a:solidFill>
-              <a:latin typeface="Arial"/>
-            </a:endParaRPr>
-          </a:p>
-        </p:txBody>
-      </p:sp>
+      </p:pic>
     </p:spTree>
   </p:cSld>
   <mc:AlternateContent>

</xml_diff>